<commit_message>
Redid analyses of rounds 6, 7, 8, dropping people who suck.
</commit_message>
<xml_diff>
--- a/Paper/Figures.pptx
+++ b/Paper/Figures.pptx
@@ -243,11 +243,11 @@
         </c:dLbls>
         <c:gapWidth val="40"/>
         <c:overlap val="-10"/>
-        <c:axId val="81475072"/>
-        <c:axId val="81476608"/>
+        <c:axId val="57531008"/>
+        <c:axId val="57538048"/>
       </c:barChart>
       <c:catAx>
-        <c:axId val="81475072"/>
+        <c:axId val="57531008"/>
         <c:scaling>
           <c:orientation val="minMax"/>
         </c:scaling>
@@ -282,7 +282,7 @@
             <a:endParaRPr lang="en-US"/>
           </a:p>
         </c:txPr>
-        <c:crossAx val="81476608"/>
+        <c:crossAx val="57538048"/>
         <c:crosses val="autoZero"/>
         <c:auto val="1"/>
         <c:lblAlgn val="ctr"/>
@@ -290,7 +290,7 @@
         <c:noMultiLvlLbl val="1"/>
       </c:catAx>
       <c:valAx>
-        <c:axId val="81476608"/>
+        <c:axId val="57538048"/>
         <c:scaling>
           <c:orientation val="minMax"/>
         </c:scaling>
@@ -374,7 +374,7 @@
             <a:endParaRPr lang="en-US"/>
           </a:p>
         </c:txPr>
-        <c:crossAx val="81475072"/>
+        <c:crossAx val="57531008"/>
         <c:crosses val="autoZero"/>
         <c:crossBetween val="between"/>
         <c:majorUnit val="15"/>
@@ -508,9 +508,9 @@
           </c:spPr>
           <c:invertIfNegative val="0"/>
           <c:cat>
-            <c:strRef>
+            <c:multiLvlStrRef>
               <c:f>Sheet1!$B$1:$B$1</c:f>
-            </c:strRef>
+            </c:multiLvlStrRef>
           </c:cat>
           <c:val>
             <c:numRef>
@@ -551,9 +551,9 @@
           </c:spPr>
           <c:invertIfNegative val="0"/>
           <c:cat>
-            <c:strRef>
+            <c:multiLvlStrRef>
               <c:f>Sheet1!$B$1:$B$1</c:f>
-            </c:strRef>
+            </c:multiLvlStrRef>
           </c:cat>
           <c:val>
             <c:numRef>
@@ -578,11 +578,11 @@
         </c:dLbls>
         <c:gapWidth val="40"/>
         <c:overlap val="-10"/>
-        <c:axId val="60920576"/>
-        <c:axId val="60922112"/>
+        <c:axId val="61982976"/>
+        <c:axId val="84561920"/>
       </c:barChart>
       <c:catAx>
-        <c:axId val="60920576"/>
+        <c:axId val="61982976"/>
         <c:scaling>
           <c:orientation val="minMax"/>
         </c:scaling>
@@ -617,7 +617,7 @@
             <a:endParaRPr lang="en-US"/>
           </a:p>
         </c:txPr>
-        <c:crossAx val="60922112"/>
+        <c:crossAx val="84561920"/>
         <c:crosses val="autoZero"/>
         <c:auto val="1"/>
         <c:lblAlgn val="ctr"/>
@@ -625,7 +625,7 @@
         <c:noMultiLvlLbl val="1"/>
       </c:catAx>
       <c:valAx>
-        <c:axId val="60922112"/>
+        <c:axId val="84561920"/>
         <c:scaling>
           <c:orientation val="minMax"/>
         </c:scaling>
@@ -709,7 +709,7 @@
             <a:endParaRPr lang="en-US"/>
           </a:p>
         </c:txPr>
-        <c:crossAx val="60920576"/>
+        <c:crossAx val="61982976"/>
         <c:crosses val="autoZero"/>
         <c:crossBetween val="between"/>
         <c:majorUnit val="15"/>
@@ -863,10 +863,10 @@
                 <c:formatCode>General</c:formatCode>
                 <c:ptCount val="2"/>
                 <c:pt idx="0">
-                  <c:v>75</c:v>
+                  <c:v>73.099999999999994</c:v>
                 </c:pt>
                 <c:pt idx="1">
-                  <c:v>53.6</c:v>
+                  <c:v>47.7</c:v>
                 </c:pt>
               </c:numCache>
             </c:numRef>
@@ -918,10 +918,10 @@
                 <c:formatCode>General</c:formatCode>
                 <c:ptCount val="2"/>
                 <c:pt idx="0">
-                  <c:v>78.5</c:v>
+                  <c:v>77.2</c:v>
                 </c:pt>
                 <c:pt idx="1">
-                  <c:v>53</c:v>
+                  <c:v>49.2</c:v>
                 </c:pt>
               </c:numCache>
             </c:numRef>
@@ -937,11 +937,11 @@
         </c:dLbls>
         <c:gapWidth val="40"/>
         <c:overlap val="-10"/>
-        <c:axId val="7686016"/>
-        <c:axId val="7687552"/>
+        <c:axId val="56572928"/>
+        <c:axId val="56578816"/>
       </c:barChart>
       <c:catAx>
-        <c:axId val="7686016"/>
+        <c:axId val="56572928"/>
         <c:scaling>
           <c:orientation val="minMax"/>
         </c:scaling>
@@ -976,7 +976,7 @@
             <a:endParaRPr lang="en-US"/>
           </a:p>
         </c:txPr>
-        <c:crossAx val="7687552"/>
+        <c:crossAx val="56578816"/>
         <c:crosses val="autoZero"/>
         <c:auto val="1"/>
         <c:lblAlgn val="ctr"/>
@@ -984,7 +984,7 @@
         <c:noMultiLvlLbl val="1"/>
       </c:catAx>
       <c:valAx>
-        <c:axId val="7687552"/>
+        <c:axId val="56578816"/>
         <c:scaling>
           <c:orientation val="minMax"/>
           <c:min val="0"/>
@@ -1069,7 +1069,7 @@
             <a:endParaRPr lang="en-US"/>
           </a:p>
         </c:txPr>
-        <c:crossAx val="7686016"/>
+        <c:crossAx val="56572928"/>
         <c:crosses val="autoZero"/>
         <c:crossBetween val="between"/>
         <c:majorUnit val="15"/>
@@ -8038,7 +8038,7 @@
           <p:nvPr>
             <p:extLst>
               <p:ext uri="{D42A27DB-BD31-4B8C-83A1-F6EECF244321}">
-                <p14:modId xmlns:p14="http://schemas.microsoft.com/office/powerpoint/2010/main" val="3643109157"/>
+                <p14:modId xmlns:p14="http://schemas.microsoft.com/office/powerpoint/2010/main" val="3065371872"/>
               </p:ext>
             </p:extLst>
           </p:nvPr>
@@ -11268,705 +11268,1201 @@
           <a:chExt cx="0" cy="0"/>
         </a:xfrm>
       </p:grpSpPr>
-      <p:sp>
-        <p:nvSpPr>
-          <p:cNvPr id="30" name="Rectangle 29"/>
-          <p:cNvSpPr/>
-          <p:nvPr/>
-        </p:nvSpPr>
-        <p:spPr>
-          <a:xfrm>
-            <a:off x="8026400" y="990600"/>
-            <a:ext cx="1789798" cy="1032288"/>
-          </a:xfrm>
-          <a:prstGeom prst="rect">
-            <a:avLst/>
-          </a:prstGeom>
-        </p:spPr>
-        <p:style>
-          <a:lnRef idx="2">
-            <a:schemeClr val="accent3">
-              <a:shade val="50000"/>
-            </a:schemeClr>
-          </a:lnRef>
-          <a:fillRef idx="1">
-            <a:schemeClr val="accent3"/>
-          </a:fillRef>
-          <a:effectRef idx="0">
-            <a:schemeClr val="accent3"/>
-          </a:effectRef>
-          <a:fontRef idx="minor">
-            <a:schemeClr val="lt1"/>
-          </a:fontRef>
-        </p:style>
-        <p:txBody>
-          <a:bodyPr rtlCol="0" anchor="ctr"/>
-          <a:lstStyle/>
-          <a:p>
-            <a:pPr algn="ctr"/>
-            <a:endParaRPr lang="en-US"/>
-          </a:p>
-        </p:txBody>
-      </p:sp>
-      <p:sp>
-        <p:nvSpPr>
-          <p:cNvPr id="31" name="Rectangle 30"/>
-          <p:cNvSpPr/>
-          <p:nvPr/>
-        </p:nvSpPr>
-        <p:spPr>
-          <a:xfrm>
-            <a:off x="8214801" y="1279511"/>
-            <a:ext cx="659398" cy="375667"/>
-          </a:xfrm>
-          <a:prstGeom prst="rect">
-            <a:avLst/>
-          </a:prstGeom>
-        </p:spPr>
-        <p:style>
-          <a:lnRef idx="2">
-            <a:schemeClr val="dk1"/>
-          </a:lnRef>
-          <a:fillRef idx="1">
-            <a:schemeClr val="lt1"/>
-          </a:fillRef>
-          <a:effectRef idx="0">
-            <a:schemeClr val="dk1"/>
-          </a:effectRef>
-          <a:fontRef idx="minor">
-            <a:schemeClr val="dk1"/>
-          </a:fontRef>
-        </p:style>
-        <p:txBody>
-          <a:bodyPr rtlCol="0" anchor="ctr"/>
-          <a:lstStyle/>
-          <a:p>
-            <a:pPr algn="ctr"/>
-            <a:r>
-              <a:rPr lang="en-US" sz="2800" dirty="0" smtClean="0">
-                <a:latin typeface="Times New Roman" panose="02020603050405020304" pitchFamily="18" charset="0"/>
-                <a:cs typeface="Times New Roman" panose="02020603050405020304" pitchFamily="18" charset="0"/>
-              </a:rPr>
-              <a:t>A</a:t>
-            </a:r>
-            <a:endParaRPr lang="en-US" sz="2800" dirty="0">
-              <a:latin typeface="Times New Roman" panose="02020603050405020304" pitchFamily="18" charset="0"/>
-              <a:cs typeface="Times New Roman" panose="02020603050405020304" pitchFamily="18" charset="0"/>
-            </a:endParaRPr>
-          </a:p>
-        </p:txBody>
-      </p:sp>
-      <p:sp>
-        <p:nvSpPr>
-          <p:cNvPr id="32" name="Rectangle 31"/>
-          <p:cNvSpPr/>
-          <p:nvPr/>
-        </p:nvSpPr>
-        <p:spPr>
-          <a:xfrm>
-            <a:off x="8968399" y="1279511"/>
-            <a:ext cx="659398" cy="375667"/>
-          </a:xfrm>
-          <a:prstGeom prst="rect">
-            <a:avLst/>
-          </a:prstGeom>
-        </p:spPr>
-        <p:style>
-          <a:lnRef idx="2">
-            <a:schemeClr val="dk1"/>
-          </a:lnRef>
-          <a:fillRef idx="1">
-            <a:schemeClr val="lt1"/>
-          </a:fillRef>
-          <a:effectRef idx="0">
-            <a:schemeClr val="dk1"/>
-          </a:effectRef>
-          <a:fontRef idx="minor">
-            <a:schemeClr val="dk1"/>
-          </a:fontRef>
-        </p:style>
-        <p:txBody>
-          <a:bodyPr rtlCol="0" anchor="ctr"/>
-          <a:lstStyle/>
-          <a:p>
-            <a:pPr algn="ctr"/>
-            <a:r>
-              <a:rPr lang="en-US" sz="2800" dirty="0">
-                <a:latin typeface="Times New Roman" panose="02020603050405020304" pitchFamily="18" charset="0"/>
-                <a:cs typeface="Times New Roman" panose="02020603050405020304" pitchFamily="18" charset="0"/>
-              </a:rPr>
-              <a:t>B</a:t>
-            </a:r>
-          </a:p>
-        </p:txBody>
-      </p:sp>
       <p:grpSp>
         <p:nvGrpSpPr>
-          <p:cNvPr id="2" name="Group 84"/>
+          <p:cNvPr id="17" name="Group 16"/>
           <p:cNvGrpSpPr/>
           <p:nvPr/>
         </p:nvGrpSpPr>
         <p:grpSpPr>
           <a:xfrm>
-            <a:off x="254000" y="1130298"/>
-            <a:ext cx="6110762" cy="2222502"/>
-            <a:chOff x="0" y="31750"/>
-            <a:chExt cx="6110760" cy="2222501"/>
+            <a:off x="36817" y="228600"/>
+            <a:ext cx="12790183" cy="4724400"/>
+            <a:chOff x="36817" y="228600"/>
+            <a:chExt cx="12790183" cy="4724400"/>
           </a:xfrm>
         </p:grpSpPr>
         <p:sp>
           <p:nvSpPr>
-            <p:cNvPr id="3" name="Shape 70"/>
+            <p:cNvPr id="30" name="Rectangle 29"/>
             <p:cNvSpPr/>
             <p:nvPr/>
           </p:nvSpPr>
           <p:spPr>
             <a:xfrm>
-              <a:off x="3684106" y="1625856"/>
-              <a:ext cx="270908" cy="584775"/>
+              <a:off x="8026400" y="990600"/>
+              <a:ext cx="1789798" cy="1032288"/>
+            </a:xfrm>
+            <a:prstGeom prst="rect">
+              <a:avLst/>
+            </a:prstGeom>
+          </p:spPr>
+          <p:style>
+            <a:lnRef idx="2">
+              <a:schemeClr val="accent3">
+                <a:shade val="50000"/>
+              </a:schemeClr>
+            </a:lnRef>
+            <a:fillRef idx="1">
+              <a:schemeClr val="accent3"/>
+            </a:fillRef>
+            <a:effectRef idx="0">
+              <a:schemeClr val="accent3"/>
+            </a:effectRef>
+            <a:fontRef idx="minor">
+              <a:schemeClr val="lt1"/>
+            </a:fontRef>
+          </p:style>
+          <p:txBody>
+            <a:bodyPr rtlCol="0" anchor="ctr"/>
+            <a:lstStyle/>
+            <a:p>
+              <a:pPr algn="ctr"/>
+              <a:endParaRPr lang="en-US"/>
+            </a:p>
+          </p:txBody>
+        </p:sp>
+        <p:sp>
+          <p:nvSpPr>
+            <p:cNvPr id="31" name="Rectangle 30"/>
+            <p:cNvSpPr/>
+            <p:nvPr/>
+          </p:nvSpPr>
+          <p:spPr>
+            <a:xfrm>
+              <a:off x="8214801" y="1279511"/>
+              <a:ext cx="659398" cy="375667"/>
             </a:xfrm>
             <a:prstGeom prst="rect">
               <a:avLst/>
             </a:prstGeom>
             <a:solidFill>
-              <a:srgbClr val="FFFFFF"/>
+              <a:srgbClr val="FFFF00"/>
             </a:solidFill>
-            <a:ln w="12700" cap="flat">
-              <a:noFill/>
-              <a:miter lim="400000"/>
-            </a:ln>
-            <a:effectLst/>
-            <a:extLst>
-              <a:ext uri="{C572A759-6A51-4108-AA02-DFA0A04FC94B}">
-                <ma14:wrappingTextBoxFlag xmlns="" xmlns:ma14="http://schemas.microsoft.com/office/mac/drawingml/2011/main" val="1"/>
-              </a:ext>
-            </a:extLst>
           </p:spPr>
+          <p:style>
+            <a:lnRef idx="2">
+              <a:schemeClr val="dk1"/>
+            </a:lnRef>
+            <a:fillRef idx="1">
+              <a:schemeClr val="lt1"/>
+            </a:fillRef>
+            <a:effectRef idx="0">
+              <a:schemeClr val="dk1"/>
+            </a:effectRef>
+            <a:fontRef idx="minor">
+              <a:schemeClr val="dk1"/>
+            </a:fontRef>
+          </p:style>
           <p:txBody>
-            <a:bodyPr wrap="none" lIns="0" tIns="0" rIns="0" bIns="0" numCol="1" anchor="ctr">
-              <a:spAutoFit/>
-            </a:bodyPr>
-            <a:lstStyle>
-              <a:lvl1pPr>
-                <a:defRPr sz="3800">
-                  <a:latin typeface="Helvetica"/>
-                  <a:ea typeface="Helvetica"/>
-                  <a:cs typeface="Helvetica"/>
-                  <a:sym typeface="Helvetica"/>
-                </a:defRPr>
-              </a:lvl1pPr>
-            </a:lstStyle>
+            <a:bodyPr rtlCol="0" anchor="ctr"/>
+            <a:lstStyle/>
             <a:p>
-              <a:pPr lvl="0">
-                <a:defRPr sz="1800"/>
-              </a:pPr>
+              <a:pPr algn="ctr"/>
               <a:r>
-                <a:rPr lang="en-US" sz="3800" dirty="0" smtClean="0"/>
-                <a:t>2</a:t>
+                <a:rPr lang="en-US" sz="2800" dirty="0" smtClean="0">
+                  <a:latin typeface="Times New Roman" panose="02020603050405020304" pitchFamily="18" charset="0"/>
+                  <a:cs typeface="Times New Roman" panose="02020603050405020304" pitchFamily="18" charset="0"/>
+                </a:rPr>
+                <a:t>A</a:t>
               </a:r>
-              <a:endParaRPr sz="3800" dirty="0"/>
+              <a:endParaRPr lang="en-US" sz="2800" dirty="0">
+                <a:latin typeface="Times New Roman" panose="02020603050405020304" pitchFamily="18" charset="0"/>
+                <a:cs typeface="Times New Roman" panose="02020603050405020304" pitchFamily="18" charset="0"/>
+              </a:endParaRPr>
             </a:p>
           </p:txBody>
         </p:sp>
         <p:sp>
           <p:nvSpPr>
-            <p:cNvPr id="4" name="Shape 71"/>
+            <p:cNvPr id="32" name="Rectangle 31"/>
             <p:cNvSpPr/>
             <p:nvPr/>
           </p:nvSpPr>
           <p:spPr>
             <a:xfrm>
-              <a:off x="5773575" y="1625856"/>
-              <a:ext cx="270908" cy="584775"/>
+              <a:off x="8968399" y="1279511"/>
+              <a:ext cx="659398" cy="375667"/>
+            </a:xfrm>
+            <a:prstGeom prst="rect">
+              <a:avLst/>
+            </a:prstGeom>
+          </p:spPr>
+          <p:style>
+            <a:lnRef idx="2">
+              <a:schemeClr val="dk1"/>
+            </a:lnRef>
+            <a:fillRef idx="1">
+              <a:schemeClr val="lt1"/>
+            </a:fillRef>
+            <a:effectRef idx="0">
+              <a:schemeClr val="dk1"/>
+            </a:effectRef>
+            <a:fontRef idx="minor">
+              <a:schemeClr val="dk1"/>
+            </a:fontRef>
+          </p:style>
+          <p:txBody>
+            <a:bodyPr rtlCol="0" anchor="ctr"/>
+            <a:lstStyle/>
+            <a:p>
+              <a:pPr algn="ctr"/>
+              <a:r>
+                <a:rPr lang="en-US" sz="2800" dirty="0">
+                  <a:latin typeface="Times New Roman" panose="02020603050405020304" pitchFamily="18" charset="0"/>
+                  <a:cs typeface="Times New Roman" panose="02020603050405020304" pitchFamily="18" charset="0"/>
+                </a:rPr>
+                <a:t>B</a:t>
+              </a:r>
+            </a:p>
+          </p:txBody>
+        </p:sp>
+        <p:grpSp>
+          <p:nvGrpSpPr>
+            <p:cNvPr id="2" name="Group 84"/>
+            <p:cNvGrpSpPr/>
+            <p:nvPr/>
+          </p:nvGrpSpPr>
+          <p:grpSpPr>
+            <a:xfrm>
+              <a:off x="254000" y="1130298"/>
+              <a:ext cx="6110762" cy="2222502"/>
+              <a:chOff x="0" y="31750"/>
+              <a:chExt cx="6110760" cy="2222501"/>
+            </a:xfrm>
+          </p:grpSpPr>
+          <p:sp>
+            <p:nvSpPr>
+              <p:cNvPr id="3" name="Shape 70"/>
+              <p:cNvSpPr/>
+              <p:nvPr/>
+            </p:nvSpPr>
+            <p:spPr>
+              <a:xfrm>
+                <a:off x="3684106" y="1625856"/>
+                <a:ext cx="270908" cy="584775"/>
+              </a:xfrm>
+              <a:prstGeom prst="rect">
+                <a:avLst/>
+              </a:prstGeom>
+              <a:solidFill>
+                <a:srgbClr val="FFFFFF"/>
+              </a:solidFill>
+              <a:ln w="12700" cap="flat">
+                <a:noFill/>
+                <a:miter lim="400000"/>
+              </a:ln>
+              <a:effectLst/>
+              <a:extLst>
+                <a:ext uri="{C572A759-6A51-4108-AA02-DFA0A04FC94B}">
+                  <ma14:wrappingTextBoxFlag xmlns="" xmlns:ma14="http://schemas.microsoft.com/office/mac/drawingml/2011/main" val="1"/>
+                </a:ext>
+              </a:extLst>
+            </p:spPr>
+            <p:txBody>
+              <a:bodyPr wrap="none" lIns="0" tIns="0" rIns="0" bIns="0" numCol="1" anchor="ctr">
+                <a:spAutoFit/>
+              </a:bodyPr>
+              <a:lstStyle>
+                <a:lvl1pPr>
+                  <a:defRPr sz="3800">
+                    <a:latin typeface="Helvetica"/>
+                    <a:ea typeface="Helvetica"/>
+                    <a:cs typeface="Helvetica"/>
+                    <a:sym typeface="Helvetica"/>
+                  </a:defRPr>
+                </a:lvl1pPr>
+              </a:lstStyle>
+              <a:p>
+                <a:pPr lvl="0">
+                  <a:defRPr sz="1800"/>
+                </a:pPr>
+                <a:r>
+                  <a:rPr lang="en-US" sz="3800" dirty="0" smtClean="0"/>
+                  <a:t>2</a:t>
+                </a:r>
+                <a:endParaRPr sz="3800" dirty="0"/>
+              </a:p>
+            </p:txBody>
+          </p:sp>
+          <p:sp>
+            <p:nvSpPr>
+              <p:cNvPr id="4" name="Shape 71"/>
+              <p:cNvSpPr/>
+              <p:nvPr/>
+            </p:nvSpPr>
+            <p:spPr>
+              <a:xfrm>
+                <a:off x="5773575" y="1625856"/>
+                <a:ext cx="270908" cy="584775"/>
+              </a:xfrm>
+              <a:prstGeom prst="rect">
+                <a:avLst/>
+              </a:prstGeom>
+              <a:solidFill>
+                <a:srgbClr val="FFFFFF"/>
+              </a:solidFill>
+              <a:ln w="12700" cap="flat">
+                <a:noFill/>
+                <a:miter lim="400000"/>
+              </a:ln>
+              <a:effectLst/>
+              <a:extLst>
+                <a:ext uri="{C572A759-6A51-4108-AA02-DFA0A04FC94B}">
+                  <ma14:wrappingTextBoxFlag xmlns="" xmlns:ma14="http://schemas.microsoft.com/office/mac/drawingml/2011/main" val="1"/>
+                </a:ext>
+              </a:extLst>
+            </p:spPr>
+            <p:txBody>
+              <a:bodyPr wrap="none" lIns="0" tIns="0" rIns="0" bIns="0" numCol="1" anchor="ctr">
+                <a:spAutoFit/>
+              </a:bodyPr>
+              <a:lstStyle>
+                <a:lvl1pPr>
+                  <a:defRPr sz="3800">
+                    <a:latin typeface="Helvetica"/>
+                    <a:ea typeface="Helvetica"/>
+                    <a:cs typeface="Helvetica"/>
+                    <a:sym typeface="Helvetica"/>
+                  </a:defRPr>
+                </a:lvl1pPr>
+              </a:lstStyle>
+              <a:p>
+                <a:pPr lvl="0">
+                  <a:defRPr sz="1800"/>
+                </a:pPr>
+                <a:r>
+                  <a:rPr lang="en-US" sz="3800" dirty="0" smtClean="0"/>
+                  <a:t>4</a:t>
+                </a:r>
+                <a:endParaRPr sz="3800" dirty="0"/>
+              </a:p>
+            </p:txBody>
+          </p:sp>
+          <p:sp>
+            <p:nvSpPr>
+              <p:cNvPr id="5" name="Shape 72"/>
+              <p:cNvSpPr/>
+              <p:nvPr/>
+            </p:nvSpPr>
+            <p:spPr>
+              <a:xfrm>
+                <a:off x="2585556" y="1638012"/>
+                <a:ext cx="270908" cy="584775"/>
+              </a:xfrm>
+              <a:prstGeom prst="rect">
+                <a:avLst/>
+              </a:prstGeom>
+              <a:solidFill>
+                <a:srgbClr val="FFFFFF"/>
+              </a:solidFill>
+              <a:ln w="12700" cap="flat">
+                <a:noFill/>
+                <a:miter lim="400000"/>
+              </a:ln>
+              <a:effectLst/>
+              <a:extLst>
+                <a:ext uri="{C572A759-6A51-4108-AA02-DFA0A04FC94B}">
+                  <ma14:wrappingTextBoxFlag xmlns="" xmlns:ma14="http://schemas.microsoft.com/office/mac/drawingml/2011/main" val="1"/>
+                </a:ext>
+              </a:extLst>
+            </p:spPr>
+            <p:txBody>
+              <a:bodyPr wrap="none" lIns="0" tIns="0" rIns="0" bIns="0" numCol="1" anchor="ctr">
+                <a:spAutoFit/>
+              </a:bodyPr>
+              <a:lstStyle>
+                <a:lvl1pPr>
+                  <a:defRPr sz="3800">
+                    <a:latin typeface="Helvetica"/>
+                    <a:ea typeface="Helvetica"/>
+                    <a:cs typeface="Helvetica"/>
+                    <a:sym typeface="Helvetica"/>
+                  </a:defRPr>
+                </a:lvl1pPr>
+              </a:lstStyle>
+              <a:p>
+                <a:pPr lvl="0">
+                  <a:defRPr sz="1800"/>
+                </a:pPr>
+                <a:r>
+                  <a:rPr lang="en-US" sz="3800" dirty="0" smtClean="0"/>
+                  <a:t>1</a:t>
+                </a:r>
+                <a:endParaRPr sz="3800" dirty="0"/>
+              </a:p>
+            </p:txBody>
+          </p:sp>
+          <p:sp>
+            <p:nvSpPr>
+              <p:cNvPr id="6" name="Shape 73"/>
+              <p:cNvSpPr/>
+              <p:nvPr/>
+            </p:nvSpPr>
+            <p:spPr>
+              <a:xfrm>
+                <a:off x="4723811" y="1625312"/>
+                <a:ext cx="270908" cy="584775"/>
+              </a:xfrm>
+              <a:prstGeom prst="rect">
+                <a:avLst/>
+              </a:prstGeom>
+              <a:solidFill>
+                <a:srgbClr val="FFFFFF"/>
+              </a:solidFill>
+              <a:ln w="12700" cap="flat">
+                <a:noFill/>
+                <a:miter lim="400000"/>
+              </a:ln>
+              <a:effectLst/>
+              <a:extLst>
+                <a:ext uri="{C572A759-6A51-4108-AA02-DFA0A04FC94B}">
+                  <ma14:wrappingTextBoxFlag xmlns="" xmlns:ma14="http://schemas.microsoft.com/office/mac/drawingml/2011/main" val="1"/>
+                </a:ext>
+              </a:extLst>
+            </p:spPr>
+            <p:txBody>
+              <a:bodyPr wrap="none" lIns="0" tIns="0" rIns="0" bIns="0" numCol="1" anchor="ctr">
+                <a:spAutoFit/>
+              </a:bodyPr>
+              <a:lstStyle>
+                <a:lvl1pPr>
+                  <a:defRPr sz="3800">
+                    <a:latin typeface="Helvetica"/>
+                    <a:ea typeface="Helvetica"/>
+                    <a:cs typeface="Helvetica"/>
+                    <a:sym typeface="Helvetica"/>
+                  </a:defRPr>
+                </a:lvl1pPr>
+              </a:lstStyle>
+              <a:p>
+                <a:pPr lvl="0">
+                  <a:defRPr sz="1800"/>
+                </a:pPr>
+                <a:r>
+                  <a:rPr lang="en-US" sz="3800" dirty="0" smtClean="0"/>
+                  <a:t>3</a:t>
+                </a:r>
+                <a:endParaRPr sz="3800" dirty="0"/>
+              </a:p>
+            </p:txBody>
+          </p:sp>
+          <p:sp>
+            <p:nvSpPr>
+              <p:cNvPr id="7" name="Shape 74"/>
+              <p:cNvSpPr/>
+              <p:nvPr/>
+            </p:nvSpPr>
+            <p:spPr>
+              <a:xfrm>
+                <a:off x="0" y="1606550"/>
+                <a:ext cx="1689812" cy="647701"/>
+              </a:xfrm>
+              <a:prstGeom prst="rect">
+                <a:avLst/>
+              </a:prstGeom>
+              <a:noFill/>
+              <a:ln w="12700" cap="flat">
+                <a:noFill/>
+                <a:miter lim="400000"/>
+              </a:ln>
+              <a:effectLst/>
+              <a:extLst>
+                <a:ext uri="{C572A759-6A51-4108-AA02-DFA0A04FC94B}">
+                  <ma14:wrappingTextBoxFlag xmlns="" xmlns:ma14="http://schemas.microsoft.com/office/mac/drawingml/2011/main" val="1"/>
+                </a:ext>
+              </a:extLst>
+            </p:spPr>
+            <p:txBody>
+              <a:bodyPr wrap="none" lIns="50800" tIns="50800" rIns="50800" bIns="50800" numCol="1" anchor="ctr">
+                <a:spAutoFit/>
+              </a:bodyPr>
+              <a:lstStyle>
+                <a:lvl1pPr>
+                  <a:defRPr i="1"/>
+                </a:lvl1pPr>
+              </a:lstStyle>
+              <a:p>
+                <a:pPr lvl="0">
+                  <a:defRPr sz="1800" i="0"/>
+                </a:pPr>
+                <a:r>
+                  <a:rPr sz="3600" i="1"/>
+                  <a:t>Stage 1</a:t>
+                </a:r>
+              </a:p>
+            </p:txBody>
+          </p:sp>
+          <p:sp>
+            <p:nvSpPr>
+              <p:cNvPr id="8" name="Shape 75"/>
+              <p:cNvSpPr/>
+              <p:nvPr/>
+            </p:nvSpPr>
+            <p:spPr>
+              <a:xfrm>
+                <a:off x="3682255" y="51056"/>
+                <a:ext cx="325410" cy="584775"/>
+              </a:xfrm>
+              <a:prstGeom prst="rect">
+                <a:avLst/>
+              </a:prstGeom>
+              <a:solidFill>
+                <a:srgbClr val="FFFFFF"/>
+              </a:solidFill>
+              <a:ln w="12700" cap="flat">
+                <a:noFill/>
+                <a:miter lim="400000"/>
+              </a:ln>
+              <a:effectLst/>
+              <a:extLst>
+                <a:ext uri="{C572A759-6A51-4108-AA02-DFA0A04FC94B}">
+                  <ma14:wrappingTextBoxFlag xmlns="" xmlns:ma14="http://schemas.microsoft.com/office/mac/drawingml/2011/main" val="1"/>
+                </a:ext>
+              </a:extLst>
+            </p:spPr>
+            <p:txBody>
+              <a:bodyPr wrap="none" lIns="0" tIns="0" rIns="0" bIns="0" numCol="1" anchor="ctr">
+                <a:spAutoFit/>
+              </a:bodyPr>
+              <a:lstStyle>
+                <a:lvl1pPr>
+                  <a:defRPr sz="3800">
+                    <a:latin typeface="Helvetica"/>
+                    <a:ea typeface="Helvetica"/>
+                    <a:cs typeface="Helvetica"/>
+                    <a:sym typeface="Helvetica"/>
+                  </a:defRPr>
+                </a:lvl1pPr>
+              </a:lstStyle>
+              <a:p>
+                <a:pPr lvl="0">
+                  <a:defRPr sz="1800"/>
+                </a:pPr>
+                <a:r>
+                  <a:rPr lang="en-US" sz="3800" dirty="0" smtClean="0"/>
+                  <a:t>B</a:t>
+                </a:r>
+                <a:endParaRPr sz="3800" dirty="0"/>
+              </a:p>
+            </p:txBody>
+          </p:sp>
+          <p:sp>
+            <p:nvSpPr>
+              <p:cNvPr id="9" name="Shape 76"/>
+              <p:cNvSpPr/>
+              <p:nvPr/>
+            </p:nvSpPr>
+            <p:spPr>
+              <a:xfrm>
+                <a:off x="5758099" y="51056"/>
+                <a:ext cx="352661" cy="584775"/>
+              </a:xfrm>
+              <a:prstGeom prst="rect">
+                <a:avLst/>
+              </a:prstGeom>
+              <a:solidFill>
+                <a:srgbClr val="FFFFFF"/>
+              </a:solidFill>
+              <a:ln w="12700" cap="flat">
+                <a:noFill/>
+                <a:miter lim="400000"/>
+              </a:ln>
+              <a:effectLst/>
+              <a:extLst>
+                <a:ext uri="{C572A759-6A51-4108-AA02-DFA0A04FC94B}">
+                  <ma14:wrappingTextBoxFlag xmlns="" xmlns:ma14="http://schemas.microsoft.com/office/mac/drawingml/2011/main" val="1"/>
+                </a:ext>
+              </a:extLst>
+            </p:spPr>
+            <p:txBody>
+              <a:bodyPr wrap="none" lIns="0" tIns="0" rIns="0" bIns="0" numCol="1" anchor="ctr">
+                <a:spAutoFit/>
+              </a:bodyPr>
+              <a:lstStyle>
+                <a:lvl1pPr>
+                  <a:defRPr sz="3800">
+                    <a:latin typeface="Helvetica"/>
+                    <a:ea typeface="Helvetica"/>
+                    <a:cs typeface="Helvetica"/>
+                    <a:sym typeface="Helvetica"/>
+                  </a:defRPr>
+                </a:lvl1pPr>
+              </a:lstStyle>
+              <a:p>
+                <a:pPr lvl="0">
+                  <a:defRPr sz="1800"/>
+                </a:pPr>
+                <a:r>
+                  <a:rPr lang="en-US" sz="3800" dirty="0" smtClean="0"/>
+                  <a:t>D</a:t>
+                </a:r>
+                <a:endParaRPr sz="3800" dirty="0"/>
+              </a:p>
+            </p:txBody>
+          </p:sp>
+          <p:sp>
+            <p:nvSpPr>
+              <p:cNvPr id="10" name="Shape 77"/>
+              <p:cNvSpPr/>
+              <p:nvPr/>
+            </p:nvSpPr>
+            <p:spPr>
+              <a:xfrm>
+                <a:off x="2583705" y="63213"/>
+                <a:ext cx="325410" cy="584775"/>
+              </a:xfrm>
+              <a:prstGeom prst="rect">
+                <a:avLst/>
+              </a:prstGeom>
+              <a:solidFill>
+                <a:srgbClr val="FFFFFF"/>
+              </a:solidFill>
+              <a:ln w="12700" cap="flat">
+                <a:noFill/>
+                <a:miter lim="400000"/>
+              </a:ln>
+              <a:effectLst/>
+              <a:extLst>
+                <a:ext uri="{C572A759-6A51-4108-AA02-DFA0A04FC94B}">
+                  <ma14:wrappingTextBoxFlag xmlns="" xmlns:ma14="http://schemas.microsoft.com/office/mac/drawingml/2011/main" val="1"/>
+                </a:ext>
+              </a:extLst>
+            </p:spPr>
+            <p:txBody>
+              <a:bodyPr wrap="none" lIns="0" tIns="0" rIns="0" bIns="0" numCol="1" anchor="ctr">
+                <a:spAutoFit/>
+              </a:bodyPr>
+              <a:lstStyle>
+                <a:lvl1pPr>
+                  <a:defRPr sz="3800">
+                    <a:latin typeface="Helvetica"/>
+                    <a:ea typeface="Helvetica"/>
+                    <a:cs typeface="Helvetica"/>
+                    <a:sym typeface="Helvetica"/>
+                  </a:defRPr>
+                </a:lvl1pPr>
+              </a:lstStyle>
+              <a:p>
+                <a:pPr lvl="0">
+                  <a:defRPr sz="1800"/>
+                </a:pPr>
+                <a:r>
+                  <a:rPr lang="en-US" sz="3800" dirty="0" smtClean="0"/>
+                  <a:t>A</a:t>
+                </a:r>
+                <a:endParaRPr sz="3800" dirty="0"/>
+              </a:p>
+            </p:txBody>
+          </p:sp>
+          <p:sp>
+            <p:nvSpPr>
+              <p:cNvPr id="11" name="Shape 78"/>
+              <p:cNvSpPr/>
+              <p:nvPr/>
+            </p:nvSpPr>
+            <p:spPr>
+              <a:xfrm>
+                <a:off x="4708335" y="50513"/>
+                <a:ext cx="352661" cy="584775"/>
+              </a:xfrm>
+              <a:prstGeom prst="rect">
+                <a:avLst/>
+              </a:prstGeom>
+              <a:solidFill>
+                <a:srgbClr val="FFFFFF"/>
+              </a:solidFill>
+              <a:ln w="12700" cap="flat">
+                <a:noFill/>
+                <a:miter lim="400000"/>
+              </a:ln>
+              <a:effectLst/>
+              <a:extLst>
+                <a:ext uri="{C572A759-6A51-4108-AA02-DFA0A04FC94B}">
+                  <ma14:wrappingTextBoxFlag xmlns="" xmlns:ma14="http://schemas.microsoft.com/office/mac/drawingml/2011/main" val="1"/>
+                </a:ext>
+              </a:extLst>
+            </p:spPr>
+            <p:txBody>
+              <a:bodyPr wrap="none" lIns="0" tIns="0" rIns="0" bIns="0" numCol="1" anchor="ctr">
+                <a:spAutoFit/>
+              </a:bodyPr>
+              <a:lstStyle>
+                <a:lvl1pPr>
+                  <a:defRPr sz="3800">
+                    <a:latin typeface="Helvetica"/>
+                    <a:ea typeface="Helvetica"/>
+                    <a:cs typeface="Helvetica"/>
+                    <a:sym typeface="Helvetica"/>
+                  </a:defRPr>
+                </a:lvl1pPr>
+              </a:lstStyle>
+              <a:p>
+                <a:pPr lvl="0">
+                  <a:defRPr sz="1800"/>
+                </a:pPr>
+                <a:r>
+                  <a:rPr lang="en-US" sz="3800" dirty="0" smtClean="0"/>
+                  <a:t>C</a:t>
+                </a:r>
+                <a:endParaRPr sz="3800" dirty="0"/>
+              </a:p>
+            </p:txBody>
+          </p:sp>
+          <p:sp>
+            <p:nvSpPr>
+              <p:cNvPr id="12" name="Shape 79"/>
+              <p:cNvSpPr/>
+              <p:nvPr/>
+            </p:nvSpPr>
+            <p:spPr>
+              <a:xfrm>
+                <a:off x="25400" y="31750"/>
+                <a:ext cx="1689812" cy="647701"/>
+              </a:xfrm>
+              <a:prstGeom prst="rect">
+                <a:avLst/>
+              </a:prstGeom>
+              <a:noFill/>
+              <a:ln w="12700" cap="flat">
+                <a:noFill/>
+                <a:miter lim="400000"/>
+              </a:ln>
+              <a:effectLst/>
+              <a:extLst>
+                <a:ext uri="{C572A759-6A51-4108-AA02-DFA0A04FC94B}">
+                  <ma14:wrappingTextBoxFlag xmlns="" xmlns:ma14="http://schemas.microsoft.com/office/mac/drawingml/2011/main" val="1"/>
+                </a:ext>
+              </a:extLst>
+            </p:spPr>
+            <p:txBody>
+              <a:bodyPr wrap="none" lIns="50800" tIns="50800" rIns="50800" bIns="50800" numCol="1" anchor="ctr">
+                <a:spAutoFit/>
+              </a:bodyPr>
+              <a:lstStyle>
+                <a:lvl1pPr>
+                  <a:defRPr i="1"/>
+                </a:lvl1pPr>
+              </a:lstStyle>
+              <a:p>
+                <a:pPr lvl="0">
+                  <a:defRPr sz="1800" i="0"/>
+                </a:pPr>
+                <a:r>
+                  <a:rPr sz="3600" i="1" dirty="0"/>
+                  <a:t>Stage 0</a:t>
+                </a:r>
+              </a:p>
+            </p:txBody>
+          </p:sp>
+          <p:sp>
+            <p:nvSpPr>
+              <p:cNvPr id="13" name="Shape 80"/>
+              <p:cNvSpPr/>
+              <p:nvPr/>
+            </p:nvSpPr>
+            <p:spPr>
+              <a:xfrm>
+                <a:off x="2746410" y="864870"/>
+                <a:ext cx="1" cy="556260"/>
+              </a:xfrm>
+              <a:prstGeom prst="line">
+                <a:avLst/>
+              </a:prstGeom>
+              <a:noFill/>
+              <a:ln w="76200" cap="flat">
+                <a:solidFill>
+                  <a:srgbClr val="000000"/>
+                </a:solidFill>
+                <a:prstDash val="solid"/>
+                <a:miter lim="400000"/>
+                <a:tailEnd type="triangle" w="med" len="med"/>
+              </a:ln>
+              <a:effectLst/>
+            </p:spPr>
+            <p:txBody>
+              <a:bodyPr wrap="square" lIns="0" tIns="0" rIns="0" bIns="0" numCol="1" anchor="t">
+                <a:noAutofit/>
+              </a:bodyPr>
+              <a:lstStyle/>
+              <a:p>
+                <a:pPr lvl="0">
+                  <a:defRPr sz="3000">
+                    <a:solidFill>
+                      <a:srgbClr val="FFFFFF"/>
+                    </a:solidFill>
+                    <a:effectLst>
+                      <a:outerShdw blurRad="38100" dist="12700" dir="5400000" rotWithShape="0">
+                        <a:srgbClr val="000000">
+                          <a:alpha val="50000"/>
+                        </a:srgbClr>
+                      </a:outerShdw>
+                    </a:effectLst>
+                    <a:latin typeface="Gill Sans"/>
+                    <a:ea typeface="Gill Sans"/>
+                    <a:cs typeface="Gill Sans"/>
+                    <a:sym typeface="Gill Sans"/>
+                  </a:defRPr>
+                </a:pPr>
+                <a:endParaRPr/>
+              </a:p>
+            </p:txBody>
+          </p:sp>
+          <p:sp>
+            <p:nvSpPr>
+              <p:cNvPr id="14" name="Shape 81"/>
+              <p:cNvSpPr/>
+              <p:nvPr/>
+            </p:nvSpPr>
+            <p:spPr>
+              <a:xfrm>
+                <a:off x="3844960" y="852713"/>
+                <a:ext cx="1" cy="556261"/>
+              </a:xfrm>
+              <a:prstGeom prst="line">
+                <a:avLst/>
+              </a:prstGeom>
+              <a:noFill/>
+              <a:ln w="76200" cap="flat">
+                <a:solidFill>
+                  <a:srgbClr val="000000"/>
+                </a:solidFill>
+                <a:prstDash val="solid"/>
+                <a:miter lim="400000"/>
+                <a:tailEnd type="triangle" w="med" len="med"/>
+              </a:ln>
+              <a:effectLst/>
+            </p:spPr>
+            <p:txBody>
+              <a:bodyPr wrap="square" lIns="0" tIns="0" rIns="0" bIns="0" numCol="1" anchor="t">
+                <a:noAutofit/>
+              </a:bodyPr>
+              <a:lstStyle/>
+              <a:p>
+                <a:pPr lvl="0">
+                  <a:defRPr sz="3000">
+                    <a:solidFill>
+                      <a:srgbClr val="FFFFFF"/>
+                    </a:solidFill>
+                    <a:effectLst>
+                      <a:outerShdw blurRad="38100" dist="12700" dir="5400000" rotWithShape="0">
+                        <a:srgbClr val="000000">
+                          <a:alpha val="50000"/>
+                        </a:srgbClr>
+                      </a:outerShdw>
+                    </a:effectLst>
+                    <a:latin typeface="Gill Sans"/>
+                    <a:ea typeface="Gill Sans"/>
+                    <a:cs typeface="Gill Sans"/>
+                    <a:sym typeface="Gill Sans"/>
+                  </a:defRPr>
+                </a:pPr>
+                <a:endParaRPr/>
+              </a:p>
+            </p:txBody>
+          </p:sp>
+          <p:sp>
+            <p:nvSpPr>
+              <p:cNvPr id="15" name="Shape 82"/>
+              <p:cNvSpPr/>
+              <p:nvPr/>
+            </p:nvSpPr>
+            <p:spPr>
+              <a:xfrm>
+                <a:off x="4889694" y="852713"/>
+                <a:ext cx="1" cy="556261"/>
+              </a:xfrm>
+              <a:prstGeom prst="line">
+                <a:avLst/>
+              </a:prstGeom>
+              <a:noFill/>
+              <a:ln w="76200" cap="flat">
+                <a:solidFill>
+                  <a:srgbClr val="000000"/>
+                </a:solidFill>
+                <a:prstDash val="solid"/>
+                <a:miter lim="400000"/>
+                <a:tailEnd type="triangle" w="med" len="med"/>
+              </a:ln>
+              <a:effectLst/>
+            </p:spPr>
+            <p:txBody>
+              <a:bodyPr wrap="square" lIns="0" tIns="0" rIns="0" bIns="0" numCol="1" anchor="t">
+                <a:noAutofit/>
+              </a:bodyPr>
+              <a:lstStyle/>
+              <a:p>
+                <a:pPr lvl="0">
+                  <a:defRPr sz="3000">
+                    <a:solidFill>
+                      <a:srgbClr val="FFFFFF"/>
+                    </a:solidFill>
+                    <a:effectLst>
+                      <a:outerShdw blurRad="38100" dist="12700" dir="5400000" rotWithShape="0">
+                        <a:srgbClr val="000000">
+                          <a:alpha val="50000"/>
+                        </a:srgbClr>
+                      </a:outerShdw>
+                    </a:effectLst>
+                    <a:latin typeface="Gill Sans"/>
+                    <a:ea typeface="Gill Sans"/>
+                    <a:cs typeface="Gill Sans"/>
+                    <a:sym typeface="Gill Sans"/>
+                  </a:defRPr>
+                </a:pPr>
+                <a:endParaRPr/>
+              </a:p>
+            </p:txBody>
+          </p:sp>
+          <p:sp>
+            <p:nvSpPr>
+              <p:cNvPr id="16" name="Shape 83"/>
+              <p:cNvSpPr/>
+              <p:nvPr/>
+            </p:nvSpPr>
+            <p:spPr>
+              <a:xfrm>
+                <a:off x="5934429" y="852713"/>
+                <a:ext cx="1" cy="556261"/>
+              </a:xfrm>
+              <a:prstGeom prst="line">
+                <a:avLst/>
+              </a:prstGeom>
+              <a:noFill/>
+              <a:ln w="76200" cap="flat">
+                <a:solidFill>
+                  <a:srgbClr val="000000"/>
+                </a:solidFill>
+                <a:prstDash val="solid"/>
+                <a:miter lim="400000"/>
+                <a:tailEnd type="triangle" w="med" len="med"/>
+              </a:ln>
+              <a:effectLst/>
+            </p:spPr>
+            <p:txBody>
+              <a:bodyPr wrap="square" lIns="0" tIns="0" rIns="0" bIns="0" numCol="1" anchor="t">
+                <a:noAutofit/>
+              </a:bodyPr>
+              <a:lstStyle/>
+              <a:p>
+                <a:pPr lvl="0">
+                  <a:defRPr sz="3000">
+                    <a:solidFill>
+                      <a:srgbClr val="FFFFFF"/>
+                    </a:solidFill>
+                    <a:effectLst>
+                      <a:outerShdw blurRad="38100" dist="12700" dir="5400000" rotWithShape="0">
+                        <a:srgbClr val="000000">
+                          <a:alpha val="50000"/>
+                        </a:srgbClr>
+                      </a:outerShdw>
+                    </a:effectLst>
+                    <a:latin typeface="Gill Sans"/>
+                    <a:ea typeface="Gill Sans"/>
+                    <a:cs typeface="Gill Sans"/>
+                    <a:sym typeface="Gill Sans"/>
+                  </a:defRPr>
+                </a:pPr>
+                <a:endParaRPr/>
+              </a:p>
+            </p:txBody>
+          </p:sp>
+        </p:grpSp>
+        <p:cxnSp>
+          <p:nvCxnSpPr>
+            <p:cNvPr id="18" name="Straight Arrow Connector 17"/>
+            <p:cNvCxnSpPr/>
+            <p:nvPr/>
+          </p:nvCxnSpPr>
+          <p:spPr>
+            <a:xfrm>
+              <a:off x="7488357" y="1804822"/>
+              <a:ext cx="4342314" cy="3148178"/>
+            </a:xfrm>
+            <a:prstGeom prst="straightConnector1">
+              <a:avLst/>
+            </a:prstGeom>
+            <a:ln>
+              <a:tailEnd type="arrow"/>
+            </a:ln>
+          </p:spPr>
+          <p:style>
+            <a:lnRef idx="1">
+              <a:schemeClr val="dk1"/>
+            </a:lnRef>
+            <a:fillRef idx="0">
+              <a:schemeClr val="dk1"/>
+            </a:fillRef>
+            <a:effectRef idx="0">
+              <a:schemeClr val="dk1"/>
+            </a:effectRef>
+            <a:fontRef idx="minor">
+              <a:schemeClr val="tx1"/>
+            </a:fontRef>
+          </p:style>
+        </p:cxnSp>
+        <p:sp>
+          <p:nvSpPr>
+            <p:cNvPr id="19" name="TextBox 18"/>
+            <p:cNvSpPr txBox="1"/>
+            <p:nvPr/>
+          </p:nvSpPr>
+          <p:spPr>
+            <a:xfrm>
+              <a:off x="7299957" y="1899022"/>
+              <a:ext cx="481940" cy="456575"/>
+            </a:xfrm>
+            <a:prstGeom prst="rect">
+              <a:avLst/>
+            </a:prstGeom>
+            <a:noFill/>
+          </p:spPr>
+          <p:txBody>
+            <a:bodyPr wrap="none" rtlCol="0">
+              <a:spAutoFit/>
+            </a:bodyPr>
+            <a:lstStyle/>
+            <a:p>
+              <a:r>
+                <a:rPr lang="en-US" dirty="0" smtClean="0">
+                  <a:latin typeface="Times New Roman" panose="02020603050405020304" pitchFamily="18" charset="0"/>
+                  <a:cs typeface="Times New Roman" panose="02020603050405020304" pitchFamily="18" charset="0"/>
+                </a:rPr>
+                <a:t>0s</a:t>
+              </a:r>
+              <a:endParaRPr lang="en-US" dirty="0">
+                <a:latin typeface="Times New Roman" panose="02020603050405020304" pitchFamily="18" charset="0"/>
+                <a:cs typeface="Times New Roman" panose="02020603050405020304" pitchFamily="18" charset="0"/>
+              </a:endParaRPr>
+            </a:p>
+          </p:txBody>
+        </p:sp>
+        <p:sp>
+          <p:nvSpPr>
+            <p:cNvPr id="20" name="Rectangle 19"/>
+            <p:cNvSpPr/>
+            <p:nvPr/>
+          </p:nvSpPr>
+          <p:spPr>
+            <a:xfrm>
+              <a:off x="9059006" y="1731624"/>
+              <a:ext cx="1789798" cy="1032288"/>
+            </a:xfrm>
+            <a:prstGeom prst="rect">
+              <a:avLst/>
+            </a:prstGeom>
+          </p:spPr>
+          <p:style>
+            <a:lnRef idx="2">
+              <a:schemeClr val="accent1">
+                <a:shade val="50000"/>
+              </a:schemeClr>
+            </a:lnRef>
+            <a:fillRef idx="1">
+              <a:schemeClr val="accent1"/>
+            </a:fillRef>
+            <a:effectRef idx="0">
+              <a:schemeClr val="accent1"/>
+            </a:effectRef>
+            <a:fontRef idx="minor">
+              <a:schemeClr val="lt1"/>
+            </a:fontRef>
+          </p:style>
+          <p:txBody>
+            <a:bodyPr rtlCol="0" anchor="ctr"/>
+            <a:lstStyle/>
+            <a:p>
+              <a:pPr algn="ctr"/>
+              <a:endParaRPr lang="en-US"/>
+            </a:p>
+          </p:txBody>
+        </p:sp>
+        <p:sp>
+          <p:nvSpPr>
+            <p:cNvPr id="21" name="Rectangle 20"/>
+            <p:cNvSpPr/>
+            <p:nvPr/>
+          </p:nvSpPr>
+          <p:spPr>
+            <a:xfrm>
+              <a:off x="9626600" y="2062733"/>
+              <a:ext cx="659398" cy="375667"/>
+            </a:xfrm>
+            <a:prstGeom prst="rect">
+              <a:avLst/>
+            </a:prstGeom>
+          </p:spPr>
+          <p:style>
+            <a:lnRef idx="2">
+              <a:schemeClr val="dk1"/>
+            </a:lnRef>
+            <a:fillRef idx="1">
+              <a:schemeClr val="lt1"/>
+            </a:fillRef>
+            <a:effectRef idx="0">
+              <a:schemeClr val="dk1"/>
+            </a:effectRef>
+            <a:fontRef idx="minor">
+              <a:schemeClr val="dk1"/>
+            </a:fontRef>
+          </p:style>
+          <p:txBody>
+            <a:bodyPr rtlCol="0" anchor="ctr"/>
+            <a:lstStyle/>
+            <a:p>
+              <a:pPr algn="ctr"/>
+              <a:r>
+                <a:rPr lang="en-US" sz="2800" dirty="0" smtClean="0">
+                  <a:latin typeface="Times New Roman" panose="02020603050405020304" pitchFamily="18" charset="0"/>
+                  <a:cs typeface="Times New Roman" panose="02020603050405020304" pitchFamily="18" charset="0"/>
+                </a:rPr>
+                <a:t>1</a:t>
+              </a:r>
+              <a:endParaRPr lang="en-US" sz="2800" dirty="0">
+                <a:latin typeface="Times New Roman" panose="02020603050405020304" pitchFamily="18" charset="0"/>
+                <a:cs typeface="Times New Roman" panose="02020603050405020304" pitchFamily="18" charset="0"/>
+              </a:endParaRPr>
+            </a:p>
+          </p:txBody>
+        </p:sp>
+        <p:sp>
+          <p:nvSpPr>
+            <p:cNvPr id="22" name="TextBox 21"/>
+            <p:cNvSpPr txBox="1"/>
+            <p:nvPr/>
+          </p:nvSpPr>
+          <p:spPr>
+            <a:xfrm>
+              <a:off x="7755087" y="2652620"/>
+              <a:ext cx="1229825" cy="646331"/>
+            </a:xfrm>
+            <a:prstGeom prst="rect">
+              <a:avLst/>
+            </a:prstGeom>
+            <a:noFill/>
+          </p:spPr>
+          <p:txBody>
+            <a:bodyPr wrap="none" rtlCol="0">
+              <a:spAutoFit/>
+            </a:bodyPr>
+            <a:lstStyle/>
+            <a:p>
+              <a:r>
+                <a:rPr lang="en-US" dirty="0" smtClean="0">
+                  <a:latin typeface="Times New Roman" panose="02020603050405020304" pitchFamily="18" charset="0"/>
+                  <a:cs typeface="Times New Roman" panose="02020603050405020304" pitchFamily="18" charset="0"/>
+                </a:rPr>
+                <a:t>+ &lt;4s</a:t>
+              </a:r>
+              <a:endParaRPr lang="en-US" dirty="0">
+                <a:latin typeface="Times New Roman" panose="02020603050405020304" pitchFamily="18" charset="0"/>
+                <a:cs typeface="Times New Roman" panose="02020603050405020304" pitchFamily="18" charset="0"/>
+              </a:endParaRPr>
+            </a:p>
+          </p:txBody>
+        </p:sp>
+        <p:sp>
+          <p:nvSpPr>
+            <p:cNvPr id="24" name="Rectangle 23"/>
+            <p:cNvSpPr/>
+            <p:nvPr/>
+          </p:nvSpPr>
+          <p:spPr>
+            <a:xfrm>
+              <a:off x="10001004" y="2485222"/>
+              <a:ext cx="1789798" cy="1032288"/>
             </a:xfrm>
             <a:prstGeom prst="rect">
               <a:avLst/>
             </a:prstGeom>
             <a:solidFill>
-              <a:srgbClr val="FFFFFF"/>
+              <a:srgbClr val="FF66FF"/>
             </a:solidFill>
-            <a:ln w="12700" cap="flat">
-              <a:noFill/>
-              <a:miter lim="400000"/>
-            </a:ln>
-            <a:effectLst/>
-            <a:extLst>
-              <a:ext uri="{C572A759-6A51-4108-AA02-DFA0A04FC94B}">
-                <ma14:wrappingTextBoxFlag xmlns="" xmlns:ma14="http://schemas.microsoft.com/office/mac/drawingml/2011/main" val="1"/>
-              </a:ext>
-            </a:extLst>
           </p:spPr>
+          <p:style>
+            <a:lnRef idx="2">
+              <a:schemeClr val="accent1">
+                <a:shade val="50000"/>
+              </a:schemeClr>
+            </a:lnRef>
+            <a:fillRef idx="1">
+              <a:schemeClr val="accent1"/>
+            </a:fillRef>
+            <a:effectRef idx="0">
+              <a:schemeClr val="accent1"/>
+            </a:effectRef>
+            <a:fontRef idx="minor">
+              <a:schemeClr val="lt1"/>
+            </a:fontRef>
+          </p:style>
           <p:txBody>
-            <a:bodyPr wrap="none" lIns="0" tIns="0" rIns="0" bIns="0" numCol="1" anchor="ctr">
-              <a:spAutoFit/>
-            </a:bodyPr>
-            <a:lstStyle>
-              <a:lvl1pPr>
-                <a:defRPr sz="3800">
-                  <a:latin typeface="Helvetica"/>
-                  <a:ea typeface="Helvetica"/>
-                  <a:cs typeface="Helvetica"/>
-                  <a:sym typeface="Helvetica"/>
-                </a:defRPr>
-              </a:lvl1pPr>
-            </a:lstStyle>
+            <a:bodyPr rtlCol="0" anchor="ctr"/>
+            <a:lstStyle/>
             <a:p>
-              <a:pPr lvl="0">
-                <a:defRPr sz="1800"/>
-              </a:pPr>
-              <a:r>
-                <a:rPr lang="en-US" sz="3800" dirty="0" smtClean="0"/>
-                <a:t>4</a:t>
-              </a:r>
-              <a:endParaRPr sz="3800" dirty="0"/>
+              <a:pPr algn="ctr"/>
+              <a:endParaRPr lang="en-US"/>
             </a:p>
           </p:txBody>
         </p:sp>
         <p:sp>
           <p:nvSpPr>
-            <p:cNvPr id="5" name="Shape 72"/>
+            <p:cNvPr id="25" name="TextBox 24"/>
+            <p:cNvSpPr txBox="1"/>
+            <p:nvPr/>
+          </p:nvSpPr>
+          <p:spPr>
+            <a:xfrm>
+              <a:off x="8864600" y="3420642"/>
+              <a:ext cx="1229825" cy="646331"/>
+            </a:xfrm>
+            <a:prstGeom prst="rect">
+              <a:avLst/>
+            </a:prstGeom>
+            <a:noFill/>
+          </p:spPr>
+          <p:txBody>
+            <a:bodyPr wrap="none" rtlCol="0">
+              <a:spAutoFit/>
+            </a:bodyPr>
+            <a:lstStyle/>
+            <a:p>
+              <a:r>
+                <a:rPr lang="en-US" dirty="0" smtClean="0">
+                  <a:latin typeface="Times New Roman" panose="02020603050405020304" pitchFamily="18" charset="0"/>
+                  <a:cs typeface="Times New Roman" panose="02020603050405020304" pitchFamily="18" charset="0"/>
+                </a:rPr>
+                <a:t>+ &lt;4s</a:t>
+              </a:r>
+              <a:endParaRPr lang="en-US" dirty="0">
+                <a:latin typeface="Times New Roman" panose="02020603050405020304" pitchFamily="18" charset="0"/>
+                <a:cs typeface="Times New Roman" panose="02020603050405020304" pitchFamily="18" charset="0"/>
+              </a:endParaRPr>
+            </a:p>
+          </p:txBody>
+        </p:sp>
+        <p:sp>
+          <p:nvSpPr>
+            <p:cNvPr id="26" name="Shape 37"/>
             <p:cNvSpPr/>
             <p:nvPr/>
           </p:nvSpPr>
           <p:spPr>
             <a:xfrm>
-              <a:off x="2585556" y="1638012"/>
-              <a:ext cx="270908" cy="584775"/>
+              <a:off x="10677865" y="2798424"/>
+              <a:ext cx="472735" cy="472735"/>
             </a:xfrm>
             <a:prstGeom prst="rect">
               <a:avLst/>
             </a:prstGeom>
             <a:solidFill>
-              <a:srgbClr val="FFFFFF"/>
+              <a:srgbClr val="51A7F9"/>
             </a:solidFill>
-            <a:ln w="12700" cap="flat">
-              <a:noFill/>
+            <a:ln w="12700">
               <a:miter lim="400000"/>
             </a:ln>
-            <a:effectLst/>
-            <a:extLst>
-              <a:ext uri="{C572A759-6A51-4108-AA02-DFA0A04FC94B}">
-                <ma14:wrappingTextBoxFlag xmlns="" xmlns:ma14="http://schemas.microsoft.com/office/mac/drawingml/2011/main" val="1"/>
-              </a:ext>
-            </a:extLst>
           </p:spPr>
           <p:txBody>
-            <a:bodyPr wrap="none" lIns="0" tIns="0" rIns="0" bIns="0" numCol="1" anchor="ctr">
-              <a:spAutoFit/>
-            </a:bodyPr>
-            <a:lstStyle>
-              <a:lvl1pPr>
-                <a:defRPr sz="3800">
-                  <a:latin typeface="Helvetica"/>
-                  <a:ea typeface="Helvetica"/>
-                  <a:cs typeface="Helvetica"/>
-                  <a:sym typeface="Helvetica"/>
-                </a:defRPr>
-              </a:lvl1pPr>
-            </a:lstStyle>
-            <a:p>
-              <a:pPr lvl="0">
-                <a:defRPr sz="1800"/>
-              </a:pPr>
-              <a:r>
-                <a:rPr lang="en-US" sz="3800" dirty="0" smtClean="0"/>
-                <a:t>1</a:t>
-              </a:r>
-              <a:endParaRPr sz="3800" dirty="0"/>
-            </a:p>
-          </p:txBody>
-        </p:sp>
-        <p:sp>
-          <p:nvSpPr>
-            <p:cNvPr id="6" name="Shape 73"/>
-            <p:cNvSpPr/>
-            <p:nvPr/>
-          </p:nvSpPr>
-          <p:spPr>
-            <a:xfrm>
-              <a:off x="4723811" y="1625312"/>
-              <a:ext cx="270908" cy="584775"/>
-            </a:xfrm>
-            <a:prstGeom prst="rect">
-              <a:avLst/>
-            </a:prstGeom>
-            <a:solidFill>
-              <a:srgbClr val="FFFFFF"/>
-            </a:solidFill>
-            <a:ln w="12700" cap="flat">
-              <a:noFill/>
-              <a:miter lim="400000"/>
-            </a:ln>
-            <a:effectLst/>
-            <a:extLst>
-              <a:ext uri="{C572A759-6A51-4108-AA02-DFA0A04FC94B}">
-                <ma14:wrappingTextBoxFlag xmlns="" xmlns:ma14="http://schemas.microsoft.com/office/mac/drawingml/2011/main" val="1"/>
-              </a:ext>
-            </a:extLst>
-          </p:spPr>
-          <p:txBody>
-            <a:bodyPr wrap="none" lIns="0" tIns="0" rIns="0" bIns="0" numCol="1" anchor="ctr">
-              <a:spAutoFit/>
-            </a:bodyPr>
-            <a:lstStyle>
-              <a:lvl1pPr>
-                <a:defRPr sz="3800">
-                  <a:latin typeface="Helvetica"/>
-                  <a:ea typeface="Helvetica"/>
-                  <a:cs typeface="Helvetica"/>
-                  <a:sym typeface="Helvetica"/>
-                </a:defRPr>
-              </a:lvl1pPr>
-            </a:lstStyle>
-            <a:p>
-              <a:pPr lvl="0">
-                <a:defRPr sz="1800"/>
-              </a:pPr>
-              <a:r>
-                <a:rPr lang="en-US" sz="3800" dirty="0" smtClean="0"/>
-                <a:t>3</a:t>
-              </a:r>
-              <a:endParaRPr sz="3800" dirty="0"/>
-            </a:p>
-          </p:txBody>
-        </p:sp>
-        <p:sp>
-          <p:nvSpPr>
-            <p:cNvPr id="7" name="Shape 74"/>
-            <p:cNvSpPr/>
-            <p:nvPr/>
-          </p:nvSpPr>
-          <p:spPr>
-            <a:xfrm>
-              <a:off x="0" y="1606550"/>
-              <a:ext cx="1689812" cy="647701"/>
-            </a:xfrm>
-            <a:prstGeom prst="rect">
-              <a:avLst/>
-            </a:prstGeom>
-            <a:noFill/>
-            <a:ln w="12700" cap="flat">
-              <a:noFill/>
-              <a:miter lim="400000"/>
-            </a:ln>
-            <a:effectLst/>
-            <a:extLst>
-              <a:ext uri="{C572A759-6A51-4108-AA02-DFA0A04FC94B}">
-                <ma14:wrappingTextBoxFlag xmlns="" xmlns:ma14="http://schemas.microsoft.com/office/mac/drawingml/2011/main" val="1"/>
-              </a:ext>
-            </a:extLst>
-          </p:spPr>
-          <p:txBody>
-            <a:bodyPr wrap="none" lIns="50800" tIns="50800" rIns="50800" bIns="50800" numCol="1" anchor="ctr">
-              <a:spAutoFit/>
-            </a:bodyPr>
-            <a:lstStyle>
-              <a:lvl1pPr>
-                <a:defRPr i="1"/>
-              </a:lvl1pPr>
-            </a:lstStyle>
-            <a:p>
-              <a:pPr lvl="0">
-                <a:defRPr sz="1800" i="0"/>
-              </a:pPr>
-              <a:r>
-                <a:rPr sz="3600" i="1"/>
-                <a:t>Stage 1</a:t>
-              </a:r>
-            </a:p>
-          </p:txBody>
-        </p:sp>
-        <p:sp>
-          <p:nvSpPr>
-            <p:cNvPr id="8" name="Shape 75"/>
-            <p:cNvSpPr/>
-            <p:nvPr/>
-          </p:nvSpPr>
-          <p:spPr>
-            <a:xfrm>
-              <a:off x="3682255" y="51056"/>
-              <a:ext cx="325410" cy="584775"/>
-            </a:xfrm>
-            <a:prstGeom prst="rect">
-              <a:avLst/>
-            </a:prstGeom>
-            <a:solidFill>
-              <a:srgbClr val="FFFFFF"/>
-            </a:solidFill>
-            <a:ln w="12700" cap="flat">
-              <a:noFill/>
-              <a:miter lim="400000"/>
-            </a:ln>
-            <a:effectLst/>
-            <a:extLst>
-              <a:ext uri="{C572A759-6A51-4108-AA02-DFA0A04FC94B}">
-                <ma14:wrappingTextBoxFlag xmlns="" xmlns:ma14="http://schemas.microsoft.com/office/mac/drawingml/2011/main" val="1"/>
-              </a:ext>
-            </a:extLst>
-          </p:spPr>
-          <p:txBody>
-            <a:bodyPr wrap="none" lIns="0" tIns="0" rIns="0" bIns="0" numCol="1" anchor="ctr">
-              <a:spAutoFit/>
-            </a:bodyPr>
-            <a:lstStyle>
-              <a:lvl1pPr>
-                <a:defRPr sz="3800">
-                  <a:latin typeface="Helvetica"/>
-                  <a:ea typeface="Helvetica"/>
-                  <a:cs typeface="Helvetica"/>
-                  <a:sym typeface="Helvetica"/>
-                </a:defRPr>
-              </a:lvl1pPr>
-            </a:lstStyle>
-            <a:p>
-              <a:pPr lvl="0">
-                <a:defRPr sz="1800"/>
-              </a:pPr>
-              <a:r>
-                <a:rPr lang="en-US" sz="3800" dirty="0" smtClean="0"/>
-                <a:t>B</a:t>
-              </a:r>
-              <a:endParaRPr sz="3800" dirty="0"/>
-            </a:p>
-          </p:txBody>
-        </p:sp>
-        <p:sp>
-          <p:nvSpPr>
-            <p:cNvPr id="9" name="Shape 76"/>
-            <p:cNvSpPr/>
-            <p:nvPr/>
-          </p:nvSpPr>
-          <p:spPr>
-            <a:xfrm>
-              <a:off x="5758099" y="51056"/>
-              <a:ext cx="352661" cy="584775"/>
-            </a:xfrm>
-            <a:prstGeom prst="rect">
-              <a:avLst/>
-            </a:prstGeom>
-            <a:solidFill>
-              <a:srgbClr val="FFFFFF"/>
-            </a:solidFill>
-            <a:ln w="12700" cap="flat">
-              <a:noFill/>
-              <a:miter lim="400000"/>
-            </a:ln>
-            <a:effectLst/>
-            <a:extLst>
-              <a:ext uri="{C572A759-6A51-4108-AA02-DFA0A04FC94B}">
-                <ma14:wrappingTextBoxFlag xmlns="" xmlns:ma14="http://schemas.microsoft.com/office/mac/drawingml/2011/main" val="1"/>
-              </a:ext>
-            </a:extLst>
-          </p:spPr>
-          <p:txBody>
-            <a:bodyPr wrap="none" lIns="0" tIns="0" rIns="0" bIns="0" numCol="1" anchor="ctr">
-              <a:spAutoFit/>
-            </a:bodyPr>
-            <a:lstStyle>
-              <a:lvl1pPr>
-                <a:defRPr sz="3800">
-                  <a:latin typeface="Helvetica"/>
-                  <a:ea typeface="Helvetica"/>
-                  <a:cs typeface="Helvetica"/>
-                  <a:sym typeface="Helvetica"/>
-                </a:defRPr>
-              </a:lvl1pPr>
-            </a:lstStyle>
-            <a:p>
-              <a:pPr lvl="0">
-                <a:defRPr sz="1800"/>
-              </a:pPr>
-              <a:r>
-                <a:rPr lang="en-US" sz="3800" dirty="0" smtClean="0"/>
-                <a:t>D</a:t>
-              </a:r>
-              <a:endParaRPr sz="3800" dirty="0"/>
-            </a:p>
-          </p:txBody>
-        </p:sp>
-        <p:sp>
-          <p:nvSpPr>
-            <p:cNvPr id="10" name="Shape 77"/>
-            <p:cNvSpPr/>
-            <p:nvPr/>
-          </p:nvSpPr>
-          <p:spPr>
-            <a:xfrm>
-              <a:off x="2583705" y="63213"/>
-              <a:ext cx="325410" cy="584775"/>
-            </a:xfrm>
-            <a:prstGeom prst="rect">
-              <a:avLst/>
-            </a:prstGeom>
-            <a:solidFill>
-              <a:srgbClr val="FFFFFF"/>
-            </a:solidFill>
-            <a:ln w="12700" cap="flat">
-              <a:noFill/>
-              <a:miter lim="400000"/>
-            </a:ln>
-            <a:effectLst/>
-            <a:extLst>
-              <a:ext uri="{C572A759-6A51-4108-AA02-DFA0A04FC94B}">
-                <ma14:wrappingTextBoxFlag xmlns="" xmlns:ma14="http://schemas.microsoft.com/office/mac/drawingml/2011/main" val="1"/>
-              </a:ext>
-            </a:extLst>
-          </p:spPr>
-          <p:txBody>
-            <a:bodyPr wrap="none" lIns="0" tIns="0" rIns="0" bIns="0" numCol="1" anchor="ctr">
-              <a:spAutoFit/>
-            </a:bodyPr>
-            <a:lstStyle>
-              <a:lvl1pPr>
-                <a:defRPr sz="3800">
-                  <a:latin typeface="Helvetica"/>
-                  <a:ea typeface="Helvetica"/>
-                  <a:cs typeface="Helvetica"/>
-                  <a:sym typeface="Helvetica"/>
-                </a:defRPr>
-              </a:lvl1pPr>
-            </a:lstStyle>
-            <a:p>
-              <a:pPr lvl="0">
-                <a:defRPr sz="1800"/>
-              </a:pPr>
-              <a:r>
-                <a:rPr lang="en-US" sz="3800" dirty="0" smtClean="0"/>
-                <a:t>A</a:t>
-              </a:r>
-              <a:endParaRPr sz="3800" dirty="0"/>
-            </a:p>
-          </p:txBody>
-        </p:sp>
-        <p:sp>
-          <p:nvSpPr>
-            <p:cNvPr id="11" name="Shape 78"/>
-            <p:cNvSpPr/>
-            <p:nvPr/>
-          </p:nvSpPr>
-          <p:spPr>
-            <a:xfrm>
-              <a:off x="4708335" y="50513"/>
-              <a:ext cx="352661" cy="584775"/>
-            </a:xfrm>
-            <a:prstGeom prst="rect">
-              <a:avLst/>
-            </a:prstGeom>
-            <a:solidFill>
-              <a:srgbClr val="FFFFFF"/>
-            </a:solidFill>
-            <a:ln w="12700" cap="flat">
-              <a:noFill/>
-              <a:miter lim="400000"/>
-            </a:ln>
-            <a:effectLst/>
-            <a:extLst>
-              <a:ext uri="{C572A759-6A51-4108-AA02-DFA0A04FC94B}">
-                <ma14:wrappingTextBoxFlag xmlns="" xmlns:ma14="http://schemas.microsoft.com/office/mac/drawingml/2011/main" val="1"/>
-              </a:ext>
-            </a:extLst>
-          </p:spPr>
-          <p:txBody>
-            <a:bodyPr wrap="none" lIns="0" tIns="0" rIns="0" bIns="0" numCol="1" anchor="ctr">
-              <a:spAutoFit/>
-            </a:bodyPr>
-            <a:lstStyle>
-              <a:lvl1pPr>
-                <a:defRPr sz="3800">
-                  <a:latin typeface="Helvetica"/>
-                  <a:ea typeface="Helvetica"/>
-                  <a:cs typeface="Helvetica"/>
-                  <a:sym typeface="Helvetica"/>
-                </a:defRPr>
-              </a:lvl1pPr>
-            </a:lstStyle>
-            <a:p>
-              <a:pPr lvl="0">
-                <a:defRPr sz="1800"/>
-              </a:pPr>
-              <a:r>
-                <a:rPr lang="en-US" sz="3800" dirty="0" smtClean="0"/>
-                <a:t>C</a:t>
-              </a:r>
-              <a:endParaRPr sz="3800" dirty="0"/>
-            </a:p>
-          </p:txBody>
-        </p:sp>
-        <p:sp>
-          <p:nvSpPr>
-            <p:cNvPr id="12" name="Shape 79"/>
-            <p:cNvSpPr/>
-            <p:nvPr/>
-          </p:nvSpPr>
-          <p:spPr>
-            <a:xfrm>
-              <a:off x="25400" y="31750"/>
-              <a:ext cx="1689812" cy="647701"/>
-            </a:xfrm>
-            <a:prstGeom prst="rect">
-              <a:avLst/>
-            </a:prstGeom>
-            <a:noFill/>
-            <a:ln w="12700" cap="flat">
-              <a:noFill/>
-              <a:miter lim="400000"/>
-            </a:ln>
-            <a:effectLst/>
-            <a:extLst>
-              <a:ext uri="{C572A759-6A51-4108-AA02-DFA0A04FC94B}">
-                <ma14:wrappingTextBoxFlag xmlns="" xmlns:ma14="http://schemas.microsoft.com/office/mac/drawingml/2011/main" val="1"/>
-              </a:ext>
-            </a:extLst>
-          </p:spPr>
-          <p:txBody>
-            <a:bodyPr wrap="none" lIns="50800" tIns="50800" rIns="50800" bIns="50800" numCol="1" anchor="ctr">
-              <a:spAutoFit/>
-            </a:bodyPr>
-            <a:lstStyle>
-              <a:lvl1pPr>
-                <a:defRPr i="1"/>
-              </a:lvl1pPr>
-            </a:lstStyle>
-            <a:p>
-              <a:pPr lvl="0">
-                <a:defRPr sz="1800" i="0"/>
-              </a:pPr>
-              <a:r>
-                <a:rPr sz="3600" i="1" dirty="0"/>
-                <a:t>Stage 0</a:t>
-              </a:r>
-            </a:p>
-          </p:txBody>
-        </p:sp>
-        <p:sp>
-          <p:nvSpPr>
-            <p:cNvPr id="13" name="Shape 80"/>
-            <p:cNvSpPr/>
-            <p:nvPr/>
-          </p:nvSpPr>
-          <p:spPr>
-            <a:xfrm>
-              <a:off x="2746410" y="864870"/>
-              <a:ext cx="1" cy="556260"/>
-            </a:xfrm>
-            <a:prstGeom prst="line">
-              <a:avLst/>
-            </a:prstGeom>
-            <a:noFill/>
-            <a:ln w="76200" cap="flat">
-              <a:solidFill>
-                <a:srgbClr val="000000"/>
-              </a:solidFill>
-              <a:prstDash val="solid"/>
-              <a:miter lim="400000"/>
-              <a:tailEnd type="triangle" w="med" len="med"/>
-            </a:ln>
-            <a:effectLst/>
-          </p:spPr>
-          <p:txBody>
-            <a:bodyPr wrap="square" lIns="0" tIns="0" rIns="0" bIns="0" numCol="1" anchor="t">
-              <a:noAutofit/>
-            </a:bodyPr>
+            <a:bodyPr lIns="0" tIns="0" rIns="0" bIns="0" anchor="ctr"/>
             <a:lstStyle/>
             <a:p>
               <a:pPr lvl="0">
@@ -11981,10 +12477,10 @@
                       </a:srgbClr>
                     </a:outerShdw>
                   </a:effectLst>
-                  <a:latin typeface="Gill Sans"/>
-                  <a:ea typeface="Gill Sans"/>
-                  <a:cs typeface="Gill Sans"/>
-                  <a:sym typeface="Gill Sans"/>
+                  <a:latin typeface="Whitney Medium"/>
+                  <a:ea typeface="Whitney Medium"/>
+                  <a:cs typeface="Whitney Medium"/>
+                  <a:sym typeface="Whitney Medium"/>
                 </a:defRPr>
               </a:pPr>
               <a:endParaRPr/>
@@ -11993,669 +12489,191 @@
         </p:sp>
         <p:sp>
           <p:nvSpPr>
-            <p:cNvPr id="14" name="Shape 81"/>
+            <p:cNvPr id="27" name="TextBox 26"/>
+            <p:cNvSpPr txBox="1"/>
+            <p:nvPr/>
+          </p:nvSpPr>
+          <p:spPr>
+            <a:xfrm>
+              <a:off x="7035800" y="228600"/>
+              <a:ext cx="663963" cy="523220"/>
+            </a:xfrm>
+            <a:prstGeom prst="rect">
+              <a:avLst/>
+            </a:prstGeom>
+            <a:noFill/>
+          </p:spPr>
+          <p:txBody>
+            <a:bodyPr wrap="none" rtlCol="0">
+              <a:spAutoFit/>
+            </a:bodyPr>
+            <a:lstStyle/>
+            <a:p>
+              <a:r>
+                <a:rPr lang="en-US" sz="2800" dirty="0" smtClean="0">
+                  <a:latin typeface="Times New Roman" panose="02020603050405020304" pitchFamily="18" charset="0"/>
+                  <a:cs typeface="Times New Roman" panose="02020603050405020304" pitchFamily="18" charset="0"/>
+                </a:rPr>
+                <a:t>(B)</a:t>
+              </a:r>
+              <a:endParaRPr lang="en-US" sz="2800" dirty="0">
+                <a:latin typeface="Times New Roman" panose="02020603050405020304" pitchFamily="18" charset="0"/>
+                <a:cs typeface="Times New Roman" panose="02020603050405020304" pitchFamily="18" charset="0"/>
+              </a:endParaRPr>
+            </a:p>
+          </p:txBody>
+        </p:sp>
+        <p:sp>
+          <p:nvSpPr>
+            <p:cNvPr id="28" name="Rectangle 27"/>
             <p:cNvSpPr/>
             <p:nvPr/>
           </p:nvSpPr>
           <p:spPr>
             <a:xfrm>
-              <a:off x="3844960" y="852713"/>
-              <a:ext cx="1" cy="556261"/>
+              <a:off x="11037202" y="3234912"/>
+              <a:ext cx="1789798" cy="1032288"/>
             </a:xfrm>
-            <a:prstGeom prst="line">
+            <a:prstGeom prst="rect">
               <a:avLst/>
             </a:prstGeom>
-            <a:noFill/>
-            <a:ln w="76200" cap="flat">
-              <a:solidFill>
-                <a:srgbClr val="000000"/>
-              </a:solidFill>
-              <a:prstDash val="solid"/>
-              <a:miter lim="400000"/>
-              <a:tailEnd type="triangle" w="med" len="med"/>
-            </a:ln>
-            <a:effectLst/>
           </p:spPr>
+          <p:style>
+            <a:lnRef idx="2">
+              <a:schemeClr val="dk1"/>
+            </a:lnRef>
+            <a:fillRef idx="1">
+              <a:schemeClr val="lt1"/>
+            </a:fillRef>
+            <a:effectRef idx="0">
+              <a:schemeClr val="dk1"/>
+            </a:effectRef>
+            <a:fontRef idx="minor">
+              <a:schemeClr val="dk1"/>
+            </a:fontRef>
+          </p:style>
           <p:txBody>
-            <a:bodyPr wrap="square" lIns="0" tIns="0" rIns="0" bIns="0" numCol="1" anchor="t">
-              <a:noAutofit/>
-            </a:bodyPr>
+            <a:bodyPr rtlCol="0" anchor="ctr"/>
             <a:lstStyle/>
             <a:p>
-              <a:pPr lvl="0">
-                <a:defRPr sz="3000">
+              <a:pPr algn="ctr"/>
+              <a:r>
+                <a:rPr lang="en-US" sz="1800" dirty="0" smtClean="0">
+                  <a:latin typeface="Times New Roman" panose="02020603050405020304" pitchFamily="18" charset="0"/>
+                  <a:cs typeface="Times New Roman" panose="02020603050405020304" pitchFamily="18" charset="0"/>
+                </a:rPr>
+                <a:t>You earn</a:t>
+              </a:r>
+            </a:p>
+            <a:p>
+              <a:pPr algn="ctr"/>
+              <a:r>
+                <a:rPr lang="en-US" sz="1800" dirty="0" smtClean="0">
                   <a:solidFill>
-                    <a:srgbClr val="FFFFFF"/>
+                    <a:srgbClr val="00B050"/>
                   </a:solidFill>
-                  <a:effectLst>
-                    <a:outerShdw blurRad="38100" dist="12700" dir="5400000" rotWithShape="0">
-                      <a:srgbClr val="000000">
-                        <a:alpha val="50000"/>
-                      </a:srgbClr>
-                    </a:outerShdw>
-                  </a:effectLst>
-                  <a:latin typeface="Gill Sans"/>
-                  <a:ea typeface="Gill Sans"/>
-                  <a:cs typeface="Gill Sans"/>
-                  <a:sym typeface="Gill Sans"/>
-                </a:defRPr>
-              </a:pPr>
-              <a:endParaRPr/>
+                  <a:latin typeface="Times New Roman" panose="02020603050405020304" pitchFamily="18" charset="0"/>
+                  <a:cs typeface="Times New Roman" panose="02020603050405020304" pitchFamily="18" charset="0"/>
+                </a:rPr>
+                <a:t>+3</a:t>
+              </a:r>
+            </a:p>
+            <a:p>
+              <a:pPr algn="ctr"/>
+              <a:r>
+                <a:rPr lang="en-US" sz="1800" dirty="0">
+                  <a:latin typeface="Times New Roman" panose="02020603050405020304" pitchFamily="18" charset="0"/>
+                  <a:cs typeface="Times New Roman" panose="02020603050405020304" pitchFamily="18" charset="0"/>
+                </a:rPr>
+                <a:t>p</a:t>
+              </a:r>
+              <a:r>
+                <a:rPr lang="en-US" sz="1800" dirty="0" smtClean="0">
+                  <a:latin typeface="Times New Roman" panose="02020603050405020304" pitchFamily="18" charset="0"/>
+                  <a:cs typeface="Times New Roman" panose="02020603050405020304" pitchFamily="18" charset="0"/>
+                </a:rPr>
+                <a:t>oints.</a:t>
+              </a:r>
+              <a:endParaRPr lang="en-US" sz="1800" dirty="0">
+                <a:latin typeface="Times New Roman" panose="02020603050405020304" pitchFamily="18" charset="0"/>
+                <a:cs typeface="Times New Roman" panose="02020603050405020304" pitchFamily="18" charset="0"/>
+              </a:endParaRPr>
             </a:p>
           </p:txBody>
         </p:sp>
         <p:sp>
           <p:nvSpPr>
-            <p:cNvPr id="15" name="Shape 82"/>
-            <p:cNvSpPr/>
+            <p:cNvPr id="33" name="TextBox 32"/>
+            <p:cNvSpPr txBox="1"/>
             <p:nvPr/>
           </p:nvSpPr>
           <p:spPr>
             <a:xfrm>
-              <a:off x="4889694" y="852713"/>
-              <a:ext cx="1" cy="556261"/>
+              <a:off x="9807377" y="4191000"/>
+              <a:ext cx="1229825" cy="646331"/>
             </a:xfrm>
-            <a:prstGeom prst="line">
+            <a:prstGeom prst="rect">
               <a:avLst/>
             </a:prstGeom>
             <a:noFill/>
-            <a:ln w="76200" cap="flat">
-              <a:solidFill>
-                <a:srgbClr val="000000"/>
-              </a:solidFill>
-              <a:prstDash val="solid"/>
-              <a:miter lim="400000"/>
-              <a:tailEnd type="triangle" w="med" len="med"/>
-            </a:ln>
-            <a:effectLst/>
           </p:spPr>
           <p:txBody>
-            <a:bodyPr wrap="square" lIns="0" tIns="0" rIns="0" bIns="0" numCol="1" anchor="t">
-              <a:noAutofit/>
+            <a:bodyPr wrap="none" rtlCol="0">
+              <a:spAutoFit/>
             </a:bodyPr>
             <a:lstStyle/>
             <a:p>
-              <a:pPr lvl="0">
-                <a:defRPr sz="3000">
-                  <a:solidFill>
-                    <a:srgbClr val="FFFFFF"/>
-                  </a:solidFill>
-                  <a:effectLst>
-                    <a:outerShdw blurRad="38100" dist="12700" dir="5400000" rotWithShape="0">
-                      <a:srgbClr val="000000">
-                        <a:alpha val="50000"/>
-                      </a:srgbClr>
-                    </a:outerShdw>
-                  </a:effectLst>
-                  <a:latin typeface="Gill Sans"/>
-                  <a:ea typeface="Gill Sans"/>
-                  <a:cs typeface="Gill Sans"/>
-                  <a:sym typeface="Gill Sans"/>
-                </a:defRPr>
-              </a:pPr>
-              <a:endParaRPr/>
+              <a:r>
+                <a:rPr lang="en-US" dirty="0" smtClean="0">
+                  <a:latin typeface="Times New Roman" panose="02020603050405020304" pitchFamily="18" charset="0"/>
+                  <a:cs typeface="Times New Roman" panose="02020603050405020304" pitchFamily="18" charset="0"/>
+                </a:rPr>
+                <a:t>+ &lt;4s</a:t>
+              </a:r>
+              <a:endParaRPr lang="en-US" dirty="0">
+                <a:latin typeface="Times New Roman" panose="02020603050405020304" pitchFamily="18" charset="0"/>
+                <a:cs typeface="Times New Roman" panose="02020603050405020304" pitchFamily="18" charset="0"/>
+              </a:endParaRPr>
             </a:p>
           </p:txBody>
         </p:sp>
         <p:sp>
           <p:nvSpPr>
-            <p:cNvPr id="16" name="Shape 83"/>
-            <p:cNvSpPr/>
+            <p:cNvPr id="34" name="TextBox 33"/>
+            <p:cNvSpPr txBox="1"/>
             <p:nvPr/>
           </p:nvSpPr>
           <p:spPr>
             <a:xfrm>
-              <a:off x="5934429" y="852713"/>
-              <a:ext cx="1" cy="556261"/>
+              <a:off x="36817" y="228600"/>
+              <a:ext cx="684803" cy="523220"/>
             </a:xfrm>
-            <a:prstGeom prst="line">
+            <a:prstGeom prst="rect">
               <a:avLst/>
             </a:prstGeom>
             <a:noFill/>
-            <a:ln w="76200" cap="flat">
-              <a:solidFill>
-                <a:srgbClr val="000000"/>
-              </a:solidFill>
-              <a:prstDash val="solid"/>
-              <a:miter lim="400000"/>
-              <a:tailEnd type="triangle" w="med" len="med"/>
-            </a:ln>
-            <a:effectLst/>
           </p:spPr>
           <p:txBody>
-            <a:bodyPr wrap="square" lIns="0" tIns="0" rIns="0" bIns="0" numCol="1" anchor="t">
-              <a:noAutofit/>
+            <a:bodyPr wrap="none" rtlCol="0">
+              <a:spAutoFit/>
             </a:bodyPr>
             <a:lstStyle/>
             <a:p>
-              <a:pPr lvl="0">
-                <a:defRPr sz="3000">
-                  <a:solidFill>
-                    <a:srgbClr val="FFFFFF"/>
-                  </a:solidFill>
-                  <a:effectLst>
-                    <a:outerShdw blurRad="38100" dist="12700" dir="5400000" rotWithShape="0">
-                      <a:srgbClr val="000000">
-                        <a:alpha val="50000"/>
-                      </a:srgbClr>
-                    </a:outerShdw>
-                  </a:effectLst>
-                  <a:latin typeface="Gill Sans"/>
-                  <a:ea typeface="Gill Sans"/>
-                  <a:cs typeface="Gill Sans"/>
-                  <a:sym typeface="Gill Sans"/>
-                </a:defRPr>
-              </a:pPr>
-              <a:endParaRPr/>
+              <a:r>
+                <a:rPr lang="en-US" sz="2800" dirty="0" smtClean="0">
+                  <a:latin typeface="Times New Roman" panose="02020603050405020304" pitchFamily="18" charset="0"/>
+                  <a:cs typeface="Times New Roman" panose="02020603050405020304" pitchFamily="18" charset="0"/>
+                </a:rPr>
+                <a:t>(A)</a:t>
+              </a:r>
+              <a:endParaRPr lang="en-US" sz="2800" dirty="0">
+                <a:latin typeface="Times New Roman" panose="02020603050405020304" pitchFamily="18" charset="0"/>
+                <a:cs typeface="Times New Roman" panose="02020603050405020304" pitchFamily="18" charset="0"/>
+              </a:endParaRPr>
             </a:p>
           </p:txBody>
         </p:sp>
       </p:grpSp>
-      <p:cxnSp>
-        <p:nvCxnSpPr>
-          <p:cNvPr id="18" name="Straight Arrow Connector 17"/>
-          <p:cNvCxnSpPr/>
-          <p:nvPr/>
-        </p:nvCxnSpPr>
-        <p:spPr>
-          <a:xfrm>
-            <a:off x="7488357" y="1804822"/>
-            <a:ext cx="4342314" cy="3148178"/>
-          </a:xfrm>
-          <a:prstGeom prst="straightConnector1">
-            <a:avLst/>
-          </a:prstGeom>
-          <a:ln>
-            <a:tailEnd type="arrow"/>
-          </a:ln>
-        </p:spPr>
-        <p:style>
-          <a:lnRef idx="1">
-            <a:schemeClr val="dk1"/>
-          </a:lnRef>
-          <a:fillRef idx="0">
-            <a:schemeClr val="dk1"/>
-          </a:fillRef>
-          <a:effectRef idx="0">
-            <a:schemeClr val="dk1"/>
-          </a:effectRef>
-          <a:fontRef idx="minor">
-            <a:schemeClr val="tx1"/>
-          </a:fontRef>
-        </p:style>
-      </p:cxnSp>
-      <p:sp>
-        <p:nvSpPr>
-          <p:cNvPr id="19" name="TextBox 18"/>
-          <p:cNvSpPr txBox="1"/>
-          <p:nvPr/>
-        </p:nvSpPr>
-        <p:spPr>
-          <a:xfrm>
-            <a:off x="7299957" y="1899022"/>
-            <a:ext cx="481940" cy="456575"/>
-          </a:xfrm>
-          <a:prstGeom prst="rect">
-            <a:avLst/>
-          </a:prstGeom>
-          <a:noFill/>
-        </p:spPr>
-        <p:txBody>
-          <a:bodyPr wrap="none" rtlCol="0">
-            <a:spAutoFit/>
-          </a:bodyPr>
-          <a:lstStyle/>
-          <a:p>
-            <a:r>
-              <a:rPr lang="en-US" dirty="0" smtClean="0">
-                <a:latin typeface="Times New Roman" panose="02020603050405020304" pitchFamily="18" charset="0"/>
-                <a:cs typeface="Times New Roman" panose="02020603050405020304" pitchFamily="18" charset="0"/>
-              </a:rPr>
-              <a:t>0s</a:t>
-            </a:r>
-            <a:endParaRPr lang="en-US" dirty="0">
-              <a:latin typeface="Times New Roman" panose="02020603050405020304" pitchFamily="18" charset="0"/>
-              <a:cs typeface="Times New Roman" panose="02020603050405020304" pitchFamily="18" charset="0"/>
-            </a:endParaRPr>
-          </a:p>
-        </p:txBody>
-      </p:sp>
-      <p:sp>
-        <p:nvSpPr>
-          <p:cNvPr id="20" name="Rectangle 19"/>
-          <p:cNvSpPr/>
-          <p:nvPr/>
-        </p:nvSpPr>
-        <p:spPr>
-          <a:xfrm>
-            <a:off x="9059006" y="1731624"/>
-            <a:ext cx="1789798" cy="1032288"/>
-          </a:xfrm>
-          <a:prstGeom prst="rect">
-            <a:avLst/>
-          </a:prstGeom>
-        </p:spPr>
-        <p:style>
-          <a:lnRef idx="2">
-            <a:schemeClr val="accent1">
-              <a:shade val="50000"/>
-            </a:schemeClr>
-          </a:lnRef>
-          <a:fillRef idx="1">
-            <a:schemeClr val="accent1"/>
-          </a:fillRef>
-          <a:effectRef idx="0">
-            <a:schemeClr val="accent1"/>
-          </a:effectRef>
-          <a:fontRef idx="minor">
-            <a:schemeClr val="lt1"/>
-          </a:fontRef>
-        </p:style>
-        <p:txBody>
-          <a:bodyPr rtlCol="0" anchor="ctr"/>
-          <a:lstStyle/>
-          <a:p>
-            <a:pPr algn="ctr"/>
-            <a:endParaRPr lang="en-US"/>
-          </a:p>
-        </p:txBody>
-      </p:sp>
-      <p:sp>
-        <p:nvSpPr>
-          <p:cNvPr id="21" name="Rectangle 20"/>
-          <p:cNvSpPr/>
-          <p:nvPr/>
-        </p:nvSpPr>
-        <p:spPr>
-          <a:xfrm>
-            <a:off x="9626600" y="2062733"/>
-            <a:ext cx="659398" cy="375667"/>
-          </a:xfrm>
-          <a:prstGeom prst="rect">
-            <a:avLst/>
-          </a:prstGeom>
-        </p:spPr>
-        <p:style>
-          <a:lnRef idx="2">
-            <a:schemeClr val="dk1"/>
-          </a:lnRef>
-          <a:fillRef idx="1">
-            <a:schemeClr val="lt1"/>
-          </a:fillRef>
-          <a:effectRef idx="0">
-            <a:schemeClr val="dk1"/>
-          </a:effectRef>
-          <a:fontRef idx="minor">
-            <a:schemeClr val="dk1"/>
-          </a:fontRef>
-        </p:style>
-        <p:txBody>
-          <a:bodyPr rtlCol="0" anchor="ctr"/>
-          <a:lstStyle/>
-          <a:p>
-            <a:pPr algn="ctr"/>
-            <a:r>
-              <a:rPr lang="en-US" sz="2800" dirty="0" smtClean="0">
-                <a:latin typeface="Times New Roman" panose="02020603050405020304" pitchFamily="18" charset="0"/>
-                <a:cs typeface="Times New Roman" panose="02020603050405020304" pitchFamily="18" charset="0"/>
-              </a:rPr>
-              <a:t>1</a:t>
-            </a:r>
-            <a:endParaRPr lang="en-US" sz="2800" dirty="0">
-              <a:latin typeface="Times New Roman" panose="02020603050405020304" pitchFamily="18" charset="0"/>
-              <a:cs typeface="Times New Roman" panose="02020603050405020304" pitchFamily="18" charset="0"/>
-            </a:endParaRPr>
-          </a:p>
-        </p:txBody>
-      </p:sp>
-      <p:sp>
-        <p:nvSpPr>
-          <p:cNvPr id="22" name="TextBox 21"/>
-          <p:cNvSpPr txBox="1"/>
-          <p:nvPr/>
-        </p:nvSpPr>
-        <p:spPr>
-          <a:xfrm>
-            <a:off x="7755087" y="2652620"/>
-            <a:ext cx="1229825" cy="646331"/>
-          </a:xfrm>
-          <a:prstGeom prst="rect">
-            <a:avLst/>
-          </a:prstGeom>
-          <a:noFill/>
-        </p:spPr>
-        <p:txBody>
-          <a:bodyPr wrap="none" rtlCol="0">
-            <a:spAutoFit/>
-          </a:bodyPr>
-          <a:lstStyle/>
-          <a:p>
-            <a:r>
-              <a:rPr lang="en-US" dirty="0" smtClean="0">
-                <a:latin typeface="Times New Roman" panose="02020603050405020304" pitchFamily="18" charset="0"/>
-                <a:cs typeface="Times New Roman" panose="02020603050405020304" pitchFamily="18" charset="0"/>
-              </a:rPr>
-              <a:t>+ &lt;4s</a:t>
-            </a:r>
-            <a:endParaRPr lang="en-US" dirty="0">
-              <a:latin typeface="Times New Roman" panose="02020603050405020304" pitchFamily="18" charset="0"/>
-              <a:cs typeface="Times New Roman" panose="02020603050405020304" pitchFamily="18" charset="0"/>
-            </a:endParaRPr>
-          </a:p>
-        </p:txBody>
-      </p:sp>
-      <p:sp>
-        <p:nvSpPr>
-          <p:cNvPr id="24" name="Rectangle 23"/>
-          <p:cNvSpPr/>
-          <p:nvPr/>
-        </p:nvSpPr>
-        <p:spPr>
-          <a:xfrm>
-            <a:off x="10001004" y="2485222"/>
-            <a:ext cx="1789798" cy="1032288"/>
-          </a:xfrm>
-          <a:prstGeom prst="rect">
-            <a:avLst/>
-          </a:prstGeom>
-          <a:solidFill>
-            <a:srgbClr val="FF66FF"/>
-          </a:solidFill>
-        </p:spPr>
-        <p:style>
-          <a:lnRef idx="2">
-            <a:schemeClr val="accent1">
-              <a:shade val="50000"/>
-            </a:schemeClr>
-          </a:lnRef>
-          <a:fillRef idx="1">
-            <a:schemeClr val="accent1"/>
-          </a:fillRef>
-          <a:effectRef idx="0">
-            <a:schemeClr val="accent1"/>
-          </a:effectRef>
-          <a:fontRef idx="minor">
-            <a:schemeClr val="lt1"/>
-          </a:fontRef>
-        </p:style>
-        <p:txBody>
-          <a:bodyPr rtlCol="0" anchor="ctr"/>
-          <a:lstStyle/>
-          <a:p>
-            <a:pPr algn="ctr"/>
-            <a:endParaRPr lang="en-US"/>
-          </a:p>
-        </p:txBody>
-      </p:sp>
-      <p:sp>
-        <p:nvSpPr>
-          <p:cNvPr id="25" name="TextBox 24"/>
-          <p:cNvSpPr txBox="1"/>
-          <p:nvPr/>
-        </p:nvSpPr>
-        <p:spPr>
-          <a:xfrm>
-            <a:off x="8864600" y="3420642"/>
-            <a:ext cx="1229825" cy="646331"/>
-          </a:xfrm>
-          <a:prstGeom prst="rect">
-            <a:avLst/>
-          </a:prstGeom>
-          <a:noFill/>
-        </p:spPr>
-        <p:txBody>
-          <a:bodyPr wrap="none" rtlCol="0">
-            <a:spAutoFit/>
-          </a:bodyPr>
-          <a:lstStyle/>
-          <a:p>
-            <a:r>
-              <a:rPr lang="en-US" dirty="0" smtClean="0">
-                <a:latin typeface="Times New Roman" panose="02020603050405020304" pitchFamily="18" charset="0"/>
-                <a:cs typeface="Times New Roman" panose="02020603050405020304" pitchFamily="18" charset="0"/>
-              </a:rPr>
-              <a:t>+ &lt;4s</a:t>
-            </a:r>
-            <a:endParaRPr lang="en-US" dirty="0">
-              <a:latin typeface="Times New Roman" panose="02020603050405020304" pitchFamily="18" charset="0"/>
-              <a:cs typeface="Times New Roman" panose="02020603050405020304" pitchFamily="18" charset="0"/>
-            </a:endParaRPr>
-          </a:p>
-        </p:txBody>
-      </p:sp>
-      <p:sp>
-        <p:nvSpPr>
-          <p:cNvPr id="26" name="Shape 37"/>
-          <p:cNvSpPr/>
-          <p:nvPr/>
-        </p:nvSpPr>
-        <p:spPr>
-          <a:xfrm>
-            <a:off x="10677865" y="2798424"/>
-            <a:ext cx="472735" cy="472735"/>
-          </a:xfrm>
-          <a:prstGeom prst="rect">
-            <a:avLst/>
-          </a:prstGeom>
-          <a:solidFill>
-            <a:srgbClr val="51A7F9"/>
-          </a:solidFill>
-          <a:ln w="12700">
-            <a:miter lim="400000"/>
-          </a:ln>
-        </p:spPr>
-        <p:txBody>
-          <a:bodyPr lIns="0" tIns="0" rIns="0" bIns="0" anchor="ctr"/>
-          <a:lstStyle/>
-          <a:p>
-            <a:pPr lvl="0">
-              <a:defRPr sz="3000">
-                <a:solidFill>
-                  <a:srgbClr val="FFFFFF"/>
-                </a:solidFill>
-                <a:effectLst>
-                  <a:outerShdw blurRad="38100" dist="12700" dir="5400000" rotWithShape="0">
-                    <a:srgbClr val="000000">
-                      <a:alpha val="50000"/>
-                    </a:srgbClr>
-                  </a:outerShdw>
-                </a:effectLst>
-                <a:latin typeface="Whitney Medium"/>
-                <a:ea typeface="Whitney Medium"/>
-                <a:cs typeface="Whitney Medium"/>
-                <a:sym typeface="Whitney Medium"/>
-              </a:defRPr>
-            </a:pPr>
-            <a:endParaRPr/>
-          </a:p>
-        </p:txBody>
-      </p:sp>
-      <p:sp>
-        <p:nvSpPr>
-          <p:cNvPr id="27" name="TextBox 26"/>
-          <p:cNvSpPr txBox="1"/>
-          <p:nvPr/>
-        </p:nvSpPr>
-        <p:spPr>
-          <a:xfrm>
-            <a:off x="7035800" y="228600"/>
-            <a:ext cx="663963" cy="523220"/>
-          </a:xfrm>
-          <a:prstGeom prst="rect">
-            <a:avLst/>
-          </a:prstGeom>
-          <a:noFill/>
-        </p:spPr>
-        <p:txBody>
-          <a:bodyPr wrap="none" rtlCol="0">
-            <a:spAutoFit/>
-          </a:bodyPr>
-          <a:lstStyle/>
-          <a:p>
-            <a:r>
-              <a:rPr lang="en-US" sz="2800" dirty="0" smtClean="0">
-                <a:latin typeface="Times New Roman" panose="02020603050405020304" pitchFamily="18" charset="0"/>
-                <a:cs typeface="Times New Roman" panose="02020603050405020304" pitchFamily="18" charset="0"/>
-              </a:rPr>
-              <a:t>(B)</a:t>
-            </a:r>
-            <a:endParaRPr lang="en-US" sz="2800" dirty="0">
-              <a:latin typeface="Times New Roman" panose="02020603050405020304" pitchFamily="18" charset="0"/>
-              <a:cs typeface="Times New Roman" panose="02020603050405020304" pitchFamily="18" charset="0"/>
-            </a:endParaRPr>
-          </a:p>
-        </p:txBody>
-      </p:sp>
-      <p:sp>
-        <p:nvSpPr>
-          <p:cNvPr id="28" name="Rectangle 27"/>
-          <p:cNvSpPr/>
-          <p:nvPr/>
-        </p:nvSpPr>
-        <p:spPr>
-          <a:xfrm>
-            <a:off x="11037202" y="3234912"/>
-            <a:ext cx="1789798" cy="1032288"/>
-          </a:xfrm>
-          <a:prstGeom prst="rect">
-            <a:avLst/>
-          </a:prstGeom>
-        </p:spPr>
-        <p:style>
-          <a:lnRef idx="2">
-            <a:schemeClr val="dk1"/>
-          </a:lnRef>
-          <a:fillRef idx="1">
-            <a:schemeClr val="lt1"/>
-          </a:fillRef>
-          <a:effectRef idx="0">
-            <a:schemeClr val="dk1"/>
-          </a:effectRef>
-          <a:fontRef idx="minor">
-            <a:schemeClr val="dk1"/>
-          </a:fontRef>
-        </p:style>
-        <p:txBody>
-          <a:bodyPr rtlCol="0" anchor="ctr"/>
-          <a:lstStyle/>
-          <a:p>
-            <a:pPr algn="ctr"/>
-            <a:r>
-              <a:rPr lang="en-US" sz="1800" dirty="0" smtClean="0">
-                <a:latin typeface="Times New Roman" panose="02020603050405020304" pitchFamily="18" charset="0"/>
-                <a:cs typeface="Times New Roman" panose="02020603050405020304" pitchFamily="18" charset="0"/>
-              </a:rPr>
-              <a:t>You earn</a:t>
-            </a:r>
-          </a:p>
-          <a:p>
-            <a:pPr algn="ctr"/>
-            <a:r>
-              <a:rPr lang="en-US" sz="1800" dirty="0" smtClean="0">
-                <a:solidFill>
-                  <a:srgbClr val="00B050"/>
-                </a:solidFill>
-                <a:latin typeface="Times New Roman" panose="02020603050405020304" pitchFamily="18" charset="0"/>
-                <a:cs typeface="Times New Roman" panose="02020603050405020304" pitchFamily="18" charset="0"/>
-              </a:rPr>
-              <a:t>+3</a:t>
-            </a:r>
-          </a:p>
-          <a:p>
-            <a:pPr algn="ctr"/>
-            <a:r>
-              <a:rPr lang="en-US" sz="1800" dirty="0">
-                <a:latin typeface="Times New Roman" panose="02020603050405020304" pitchFamily="18" charset="0"/>
-                <a:cs typeface="Times New Roman" panose="02020603050405020304" pitchFamily="18" charset="0"/>
-              </a:rPr>
-              <a:t>p</a:t>
-            </a:r>
-            <a:r>
-              <a:rPr lang="en-US" sz="1800" dirty="0" smtClean="0">
-                <a:latin typeface="Times New Roman" panose="02020603050405020304" pitchFamily="18" charset="0"/>
-                <a:cs typeface="Times New Roman" panose="02020603050405020304" pitchFamily="18" charset="0"/>
-              </a:rPr>
-              <a:t>oints.</a:t>
-            </a:r>
-            <a:endParaRPr lang="en-US" sz="1800" dirty="0">
-              <a:latin typeface="Times New Roman" panose="02020603050405020304" pitchFamily="18" charset="0"/>
-              <a:cs typeface="Times New Roman" panose="02020603050405020304" pitchFamily="18" charset="0"/>
-            </a:endParaRPr>
-          </a:p>
-        </p:txBody>
-      </p:sp>
-      <p:sp>
-        <p:nvSpPr>
-          <p:cNvPr id="33" name="TextBox 32"/>
-          <p:cNvSpPr txBox="1"/>
-          <p:nvPr/>
-        </p:nvSpPr>
-        <p:spPr>
-          <a:xfrm>
-            <a:off x="9807377" y="4191000"/>
-            <a:ext cx="1229825" cy="646331"/>
-          </a:xfrm>
-          <a:prstGeom prst="rect">
-            <a:avLst/>
-          </a:prstGeom>
-          <a:noFill/>
-        </p:spPr>
-        <p:txBody>
-          <a:bodyPr wrap="none" rtlCol="0">
-            <a:spAutoFit/>
-          </a:bodyPr>
-          <a:lstStyle/>
-          <a:p>
-            <a:r>
-              <a:rPr lang="en-US" dirty="0" smtClean="0">
-                <a:latin typeface="Times New Roman" panose="02020603050405020304" pitchFamily="18" charset="0"/>
-                <a:cs typeface="Times New Roman" panose="02020603050405020304" pitchFamily="18" charset="0"/>
-              </a:rPr>
-              <a:t>+ &lt;4s</a:t>
-            </a:r>
-            <a:endParaRPr lang="en-US" dirty="0">
-              <a:latin typeface="Times New Roman" panose="02020603050405020304" pitchFamily="18" charset="0"/>
-              <a:cs typeface="Times New Roman" panose="02020603050405020304" pitchFamily="18" charset="0"/>
-            </a:endParaRPr>
-          </a:p>
-        </p:txBody>
-      </p:sp>
-      <p:sp>
-        <p:nvSpPr>
-          <p:cNvPr id="34" name="TextBox 33"/>
-          <p:cNvSpPr txBox="1"/>
-          <p:nvPr/>
-        </p:nvSpPr>
-        <p:spPr>
-          <a:xfrm>
-            <a:off x="36817" y="228600"/>
-            <a:ext cx="684803" cy="523220"/>
-          </a:xfrm>
-          <a:prstGeom prst="rect">
-            <a:avLst/>
-          </a:prstGeom>
-          <a:noFill/>
-        </p:spPr>
-        <p:txBody>
-          <a:bodyPr wrap="none" rtlCol="0">
-            <a:spAutoFit/>
-          </a:bodyPr>
-          <a:lstStyle/>
-          <a:p>
-            <a:r>
-              <a:rPr lang="en-US" sz="2800" dirty="0" smtClean="0">
-                <a:latin typeface="Times New Roman" panose="02020603050405020304" pitchFamily="18" charset="0"/>
-                <a:cs typeface="Times New Roman" panose="02020603050405020304" pitchFamily="18" charset="0"/>
-              </a:rPr>
-              <a:t>(A)</a:t>
-            </a:r>
-            <a:endParaRPr lang="en-US" sz="2800" dirty="0">
-              <a:latin typeface="Times New Roman" panose="02020603050405020304" pitchFamily="18" charset="0"/>
-              <a:cs typeface="Times New Roman" panose="02020603050405020304" pitchFamily="18" charset="0"/>
-            </a:endParaRPr>
-          </a:p>
-        </p:txBody>
-      </p:sp>
     </p:spTree>
     <p:extLst>
       <p:ext uri="{BB962C8B-B14F-4D97-AF65-F5344CB8AC3E}">
@@ -16024,10 +16042,6 @@
                 </a:rPr>
                 <a:t>3</a:t>
               </a:r>
-              <a:endParaRPr lang="en-US" sz="2800" dirty="0">
-                <a:latin typeface="Times New Roman" panose="02020603050405020304" pitchFamily="18" charset="0"/>
-                <a:cs typeface="Times New Roman" panose="02020603050405020304" pitchFamily="18" charset="0"/>
-              </a:endParaRPr>
             </a:p>
           </p:txBody>
         </p:sp>
@@ -16491,10 +16505,6 @@
                 </a:rPr>
                 <a:t>3</a:t>
               </a:r>
-              <a:endParaRPr lang="en-US" sz="2800" dirty="0">
-                <a:latin typeface="Times New Roman" panose="02020603050405020304" pitchFamily="18" charset="0"/>
-                <a:cs typeface="Times New Roman" panose="02020603050405020304" pitchFamily="18" charset="0"/>
-              </a:endParaRPr>
             </a:p>
           </p:txBody>
         </p:sp>
@@ -17677,10 +17687,6 @@
                 </a:rPr>
                 <a:t>3</a:t>
               </a:r>
-              <a:endParaRPr lang="en-US" sz="2800" dirty="0">
-                <a:latin typeface="Times New Roman" panose="02020603050405020304" pitchFamily="18" charset="0"/>
-                <a:cs typeface="Times New Roman" panose="02020603050405020304" pitchFamily="18" charset="0"/>
-              </a:endParaRPr>
             </a:p>
           </p:txBody>
         </p:sp>

</xml_diff>